<commit_message>
2022/01/19 creat python web crawler dir
</commit_message>
<xml_diff>
--- a/Moodle/GCP/GCP_VM_Install.pptx
+++ b/Moodle/GCP/GCP_VM_Install.pptx
@@ -24,6 +24,21 @@
     <p:sldId id="275" r:id="rId18"/>
     <p:sldId id="276" r:id="rId19"/>
     <p:sldId id="277" r:id="rId20"/>
+    <p:sldId id="278" r:id="rId21"/>
+    <p:sldId id="279" r:id="rId22"/>
+    <p:sldId id="286" r:id="rId23"/>
+    <p:sldId id="287" r:id="rId24"/>
+    <p:sldId id="288" r:id="rId25"/>
+    <p:sldId id="289" r:id="rId26"/>
+    <p:sldId id="280" r:id="rId27"/>
+    <p:sldId id="281" r:id="rId28"/>
+    <p:sldId id="282" r:id="rId29"/>
+    <p:sldId id="283" r:id="rId30"/>
+    <p:sldId id="284" r:id="rId31"/>
+    <p:sldId id="290" r:id="rId32"/>
+    <p:sldId id="291" r:id="rId33"/>
+    <p:sldId id="292" r:id="rId34"/>
+    <p:sldId id="293" r:id="rId35"/>
   </p:sldIdLst>
   <p:sldSz cx="12192000" cy="6858000"/>
   <p:notesSz cx="6858000" cy="9144000"/>
@@ -122,6 +137,11 @@
       </a:defRPr>
     </a:lvl9pPr>
   </p:defaultTextStyle>
+  <p:extLst>
+    <p:ext uri="{EFAFB233-063F-42B5-8137-9DF3F51BA10A}">
+      <p15:sldGuideLst xmlns:p15="http://schemas.microsoft.com/office/powerpoint/2012/main"/>
+    </p:ext>
+  </p:extLst>
 </p:presentation>
 </file>
 
@@ -272,7 +292,7 @@
           <a:p>
             <a:fld id="{19266F9D-91B3-4CC2-A731-535907DD6B1B}" type="datetimeFigureOut">
               <a:rPr lang="zh-TW" altLang="en-US" smtClean="0"/>
-              <a:t>2021/12/20</a:t>
+              <a:t>2022/1/18</a:t>
             </a:fld>
             <a:endParaRPr lang="zh-TW" altLang="en-US"/>
           </a:p>
@@ -470,7 +490,7 @@
           <a:p>
             <a:fld id="{19266F9D-91B3-4CC2-A731-535907DD6B1B}" type="datetimeFigureOut">
               <a:rPr lang="zh-TW" altLang="en-US" smtClean="0"/>
-              <a:t>2021/12/20</a:t>
+              <a:t>2022/1/18</a:t>
             </a:fld>
             <a:endParaRPr lang="zh-TW" altLang="en-US"/>
           </a:p>
@@ -678,7 +698,7 @@
           <a:p>
             <a:fld id="{19266F9D-91B3-4CC2-A731-535907DD6B1B}" type="datetimeFigureOut">
               <a:rPr lang="zh-TW" altLang="en-US" smtClean="0"/>
-              <a:t>2021/12/20</a:t>
+              <a:t>2022/1/18</a:t>
             </a:fld>
             <a:endParaRPr lang="zh-TW" altLang="en-US"/>
           </a:p>
@@ -876,7 +896,7 @@
           <a:p>
             <a:fld id="{19266F9D-91B3-4CC2-A731-535907DD6B1B}" type="datetimeFigureOut">
               <a:rPr lang="zh-TW" altLang="en-US" smtClean="0"/>
-              <a:t>2021/12/20</a:t>
+              <a:t>2022/1/18</a:t>
             </a:fld>
             <a:endParaRPr lang="zh-TW" altLang="en-US"/>
           </a:p>
@@ -1151,7 +1171,7 @@
           <a:p>
             <a:fld id="{19266F9D-91B3-4CC2-A731-535907DD6B1B}" type="datetimeFigureOut">
               <a:rPr lang="zh-TW" altLang="en-US" smtClean="0"/>
-              <a:t>2021/12/20</a:t>
+              <a:t>2022/1/18</a:t>
             </a:fld>
             <a:endParaRPr lang="zh-TW" altLang="en-US"/>
           </a:p>
@@ -1416,7 +1436,7 @@
           <a:p>
             <a:fld id="{19266F9D-91B3-4CC2-A731-535907DD6B1B}" type="datetimeFigureOut">
               <a:rPr lang="zh-TW" altLang="en-US" smtClean="0"/>
-              <a:t>2021/12/20</a:t>
+              <a:t>2022/1/18</a:t>
             </a:fld>
             <a:endParaRPr lang="zh-TW" altLang="en-US"/>
           </a:p>
@@ -1828,7 +1848,7 @@
           <a:p>
             <a:fld id="{19266F9D-91B3-4CC2-A731-535907DD6B1B}" type="datetimeFigureOut">
               <a:rPr lang="zh-TW" altLang="en-US" smtClean="0"/>
-              <a:t>2021/12/20</a:t>
+              <a:t>2022/1/18</a:t>
             </a:fld>
             <a:endParaRPr lang="zh-TW" altLang="en-US"/>
           </a:p>
@@ -1969,7 +1989,7 @@
           <a:p>
             <a:fld id="{19266F9D-91B3-4CC2-A731-535907DD6B1B}" type="datetimeFigureOut">
               <a:rPr lang="zh-TW" altLang="en-US" smtClean="0"/>
-              <a:t>2021/12/20</a:t>
+              <a:t>2022/1/18</a:t>
             </a:fld>
             <a:endParaRPr lang="zh-TW" altLang="en-US"/>
           </a:p>
@@ -2082,7 +2102,7 @@
           <a:p>
             <a:fld id="{19266F9D-91B3-4CC2-A731-535907DD6B1B}" type="datetimeFigureOut">
               <a:rPr lang="zh-TW" altLang="en-US" smtClean="0"/>
-              <a:t>2021/12/20</a:t>
+              <a:t>2022/1/18</a:t>
             </a:fld>
             <a:endParaRPr lang="zh-TW" altLang="en-US"/>
           </a:p>
@@ -2393,7 +2413,7 @@
           <a:p>
             <a:fld id="{19266F9D-91B3-4CC2-A731-535907DD6B1B}" type="datetimeFigureOut">
               <a:rPr lang="zh-TW" altLang="en-US" smtClean="0"/>
-              <a:t>2021/12/20</a:t>
+              <a:t>2022/1/18</a:t>
             </a:fld>
             <a:endParaRPr lang="zh-TW" altLang="en-US"/>
           </a:p>
@@ -2681,7 +2701,7 @@
           <a:p>
             <a:fld id="{19266F9D-91B3-4CC2-A731-535907DD6B1B}" type="datetimeFigureOut">
               <a:rPr lang="zh-TW" altLang="en-US" smtClean="0"/>
-              <a:t>2021/12/20</a:t>
+              <a:t>2022/1/18</a:t>
             </a:fld>
             <a:endParaRPr lang="zh-TW" altLang="en-US"/>
           </a:p>
@@ -2922,7 +2942,7 @@
           <a:p>
             <a:fld id="{19266F9D-91B3-4CC2-A731-535907DD6B1B}" type="datetimeFigureOut">
               <a:rPr lang="zh-TW" altLang="en-US" smtClean="0"/>
-              <a:t>2021/12/20</a:t>
+              <a:t>2022/1/18</a:t>
             </a:fld>
             <a:endParaRPr lang="zh-TW" altLang="en-US"/>
           </a:p>
@@ -3339,36 +3359,6 @@
           <a:chExt cx="0" cy="0"/>
         </a:xfrm>
       </p:grpSpPr>
-      <p:sp>
-        <p:nvSpPr>
-          <p:cNvPr id="2" name="標題 1">
-            <a:extLst>
-              <a:ext uri="{FF2B5EF4-FFF2-40B4-BE49-F238E27FC236}">
-                <a16:creationId xmlns:a16="http://schemas.microsoft.com/office/drawing/2014/main" id="{CB50EBF2-4DBA-414E-9CA5-C257AA39F8CA}"/>
-              </a:ext>
-            </a:extLst>
-          </p:cNvPr>
-          <p:cNvSpPr>
-            <a:spLocks noGrp="1"/>
-          </p:cNvSpPr>
-          <p:nvPr>
-            <p:ph type="title"/>
-          </p:nvPr>
-        </p:nvSpPr>
-        <p:spPr>
-          <a:xfrm>
-            <a:off x="838200" y="172178"/>
-            <a:ext cx="10515600" cy="851279"/>
-          </a:xfrm>
-        </p:spPr>
-        <p:txBody>
-          <a:bodyPr/>
-          <a:lstStyle/>
-          <a:p>
-            <a:endParaRPr lang="zh-TW" altLang="en-US" dirty="0"/>
-          </a:p>
-        </p:txBody>
-      </p:sp>
       <p:pic>
         <p:nvPicPr>
           <p:cNvPr id="5" name="圖片 4">
@@ -3448,6 +3438,42 @@
           <a:p>
             <a:pPr algn="ctr"/>
             <a:endParaRPr lang="zh-TW" altLang="en-US"/>
+          </a:p>
+        </p:txBody>
+      </p:sp>
+      <p:sp>
+        <p:nvSpPr>
+          <p:cNvPr id="7" name="文字方塊 6">
+            <a:extLst>
+              <a:ext uri="{FF2B5EF4-FFF2-40B4-BE49-F238E27FC236}">
+                <a16:creationId xmlns:a16="http://schemas.microsoft.com/office/drawing/2014/main" id="{21F74CF6-9030-4735-B1E3-CFD5DBC463F4}"/>
+              </a:ext>
+            </a:extLst>
+          </p:cNvPr>
+          <p:cNvSpPr txBox="1"/>
+          <p:nvPr/>
+        </p:nvSpPr>
+        <p:spPr>
+          <a:xfrm>
+            <a:off x="4152898" y="210132"/>
+            <a:ext cx="3886201" cy="584775"/>
+          </a:xfrm>
+          <a:prstGeom prst="rect">
+            <a:avLst/>
+          </a:prstGeom>
+          <a:noFill/>
+        </p:spPr>
+        <p:txBody>
+          <a:bodyPr wrap="square" rtlCol="0">
+            <a:spAutoFit/>
+          </a:bodyPr>
+          <a:lstStyle/>
+          <a:p>
+            <a:r>
+              <a:rPr lang="en-US" altLang="zh-TW" sz="3200" dirty="0"/>
+              <a:t>Setup Moodle on GCP</a:t>
+            </a:r>
+            <a:endParaRPr lang="zh-TW" altLang="en-US" sz="3200" dirty="0"/>
           </a:p>
         </p:txBody>
       </p:sp>
@@ -5943,6 +5969,1567 @@
 </p:sld>
 </file>
 
+<file path=ppt/slides/slide20.xml><?xml version="1.0" encoding="utf-8"?>
+<p:sld xmlns:a="http://schemas.openxmlformats.org/drawingml/2006/main" xmlns:r="http://schemas.openxmlformats.org/officeDocument/2006/relationships" xmlns:p="http://schemas.openxmlformats.org/presentationml/2006/main">
+  <p:cSld>
+    <p:spTree>
+      <p:nvGrpSpPr>
+        <p:cNvPr id="1" name=""/>
+        <p:cNvGrpSpPr/>
+        <p:nvPr/>
+      </p:nvGrpSpPr>
+      <p:grpSpPr>
+        <a:xfrm>
+          <a:off x="0" y="0"/>
+          <a:ext cx="0" cy="0"/>
+          <a:chOff x="0" y="0"/>
+          <a:chExt cx="0" cy="0"/>
+        </a:xfrm>
+      </p:grpSpPr>
+      <p:pic>
+        <p:nvPicPr>
+          <p:cNvPr id="5" name="圖片 4">
+            <a:extLst>
+              <a:ext uri="{FF2B5EF4-FFF2-40B4-BE49-F238E27FC236}">
+                <a16:creationId xmlns:a16="http://schemas.microsoft.com/office/drawing/2014/main" id="{2991C90D-9BC4-4345-9756-82D2AFB56A62}"/>
+              </a:ext>
+            </a:extLst>
+          </p:cNvPr>
+          <p:cNvPicPr>
+            <a:picLocks noChangeAspect="1"/>
+          </p:cNvPicPr>
+          <p:nvPr/>
+        </p:nvPicPr>
+        <p:blipFill>
+          <a:blip r:embed="rId2"/>
+          <a:stretch>
+            <a:fillRect/>
+          </a:stretch>
+        </p:blipFill>
+        <p:spPr>
+          <a:xfrm>
+            <a:off x="200985" y="2249997"/>
+            <a:ext cx="11790030" cy="2358006"/>
+          </a:xfrm>
+          <a:prstGeom prst="rect">
+            <a:avLst/>
+          </a:prstGeom>
+          <a:ln>
+            <a:solidFill>
+              <a:schemeClr val="tx1"/>
+            </a:solidFill>
+          </a:ln>
+        </p:spPr>
+      </p:pic>
+      <p:sp>
+        <p:nvSpPr>
+          <p:cNvPr id="6" name="矩形: 圓角 5">
+            <a:extLst>
+              <a:ext uri="{FF2B5EF4-FFF2-40B4-BE49-F238E27FC236}">
+                <a16:creationId xmlns:a16="http://schemas.microsoft.com/office/drawing/2014/main" id="{B9EB512D-1226-42B4-B91F-8D1EB669ACF0}"/>
+              </a:ext>
+            </a:extLst>
+          </p:cNvPr>
+          <p:cNvSpPr/>
+          <p:nvPr/>
+        </p:nvSpPr>
+        <p:spPr>
+          <a:xfrm>
+            <a:off x="11098635" y="2249997"/>
+            <a:ext cx="892380" cy="285225"/>
+          </a:xfrm>
+          <a:prstGeom prst="roundRect">
+            <a:avLst/>
+          </a:prstGeom>
+          <a:noFill/>
+          <a:ln w="38100">
+            <a:solidFill>
+              <a:srgbClr val="FF0000"/>
+            </a:solidFill>
+          </a:ln>
+        </p:spPr>
+        <p:style>
+          <a:lnRef idx="2">
+            <a:schemeClr val="accent1">
+              <a:shade val="50000"/>
+            </a:schemeClr>
+          </a:lnRef>
+          <a:fillRef idx="1">
+            <a:schemeClr val="accent1"/>
+          </a:fillRef>
+          <a:effectRef idx="0">
+            <a:schemeClr val="accent1"/>
+          </a:effectRef>
+          <a:fontRef idx="minor">
+            <a:schemeClr val="lt1"/>
+          </a:fontRef>
+        </p:style>
+        <p:txBody>
+          <a:bodyPr rtlCol="0" anchor="ctr"/>
+          <a:lstStyle/>
+          <a:p>
+            <a:pPr algn="ctr"/>
+            <a:endParaRPr lang="zh-TW" altLang="en-US"/>
+          </a:p>
+        </p:txBody>
+      </p:sp>
+    </p:spTree>
+    <p:extLst>
+      <p:ext uri="{BB962C8B-B14F-4D97-AF65-F5344CB8AC3E}">
+        <p14:creationId xmlns:p14="http://schemas.microsoft.com/office/powerpoint/2010/main" val="2585698171"/>
+      </p:ext>
+    </p:extLst>
+  </p:cSld>
+  <p:clrMapOvr>
+    <a:masterClrMapping/>
+  </p:clrMapOvr>
+</p:sld>
+</file>
+
+<file path=ppt/slides/slide21.xml><?xml version="1.0" encoding="utf-8"?>
+<p:sld xmlns:a="http://schemas.openxmlformats.org/drawingml/2006/main" xmlns:r="http://schemas.openxmlformats.org/officeDocument/2006/relationships" xmlns:p="http://schemas.openxmlformats.org/presentationml/2006/main">
+  <p:cSld>
+    <p:spTree>
+      <p:nvGrpSpPr>
+        <p:cNvPr id="1" name=""/>
+        <p:cNvGrpSpPr/>
+        <p:nvPr/>
+      </p:nvGrpSpPr>
+      <p:grpSpPr>
+        <a:xfrm>
+          <a:off x="0" y="0"/>
+          <a:ext cx="0" cy="0"/>
+          <a:chOff x="0" y="0"/>
+          <a:chExt cx="0" cy="0"/>
+        </a:xfrm>
+      </p:grpSpPr>
+      <p:pic>
+        <p:nvPicPr>
+          <p:cNvPr id="9" name="圖片 8">
+            <a:extLst>
+              <a:ext uri="{FF2B5EF4-FFF2-40B4-BE49-F238E27FC236}">
+                <a16:creationId xmlns:a16="http://schemas.microsoft.com/office/drawing/2014/main" id="{D0CA6BA9-B0B2-4CA0-A3B7-35DE26323190}"/>
+              </a:ext>
+            </a:extLst>
+          </p:cNvPr>
+          <p:cNvPicPr>
+            <a:picLocks noChangeAspect="1"/>
+          </p:cNvPicPr>
+          <p:nvPr/>
+        </p:nvPicPr>
+        <p:blipFill>
+          <a:blip r:embed="rId2"/>
+          <a:stretch>
+            <a:fillRect/>
+          </a:stretch>
+        </p:blipFill>
+        <p:spPr>
+          <a:xfrm>
+            <a:off x="1829351" y="78616"/>
+            <a:ext cx="8533297" cy="6700767"/>
+          </a:xfrm>
+          <a:prstGeom prst="rect">
+            <a:avLst/>
+          </a:prstGeom>
+        </p:spPr>
+      </p:pic>
+      <p:sp>
+        <p:nvSpPr>
+          <p:cNvPr id="6" name="矩形: 圓角 5">
+            <a:extLst>
+              <a:ext uri="{FF2B5EF4-FFF2-40B4-BE49-F238E27FC236}">
+                <a16:creationId xmlns:a16="http://schemas.microsoft.com/office/drawing/2014/main" id="{05D0F8B6-62A9-42D8-9E88-F84FE7002E4A}"/>
+              </a:ext>
+            </a:extLst>
+          </p:cNvPr>
+          <p:cNvSpPr/>
+          <p:nvPr/>
+        </p:nvSpPr>
+        <p:spPr>
+          <a:xfrm>
+            <a:off x="2785929" y="1059679"/>
+            <a:ext cx="3161080" cy="351575"/>
+          </a:xfrm>
+          <a:prstGeom prst="roundRect">
+            <a:avLst/>
+          </a:prstGeom>
+          <a:noFill/>
+          <a:ln w="38100">
+            <a:solidFill>
+              <a:srgbClr val="FF0000"/>
+            </a:solidFill>
+          </a:ln>
+        </p:spPr>
+        <p:style>
+          <a:lnRef idx="2">
+            <a:schemeClr val="accent1">
+              <a:shade val="50000"/>
+            </a:schemeClr>
+          </a:lnRef>
+          <a:fillRef idx="1">
+            <a:schemeClr val="accent1"/>
+          </a:fillRef>
+          <a:effectRef idx="0">
+            <a:schemeClr val="accent1"/>
+          </a:effectRef>
+          <a:fontRef idx="minor">
+            <a:schemeClr val="lt1"/>
+          </a:fontRef>
+        </p:style>
+        <p:txBody>
+          <a:bodyPr rtlCol="0" anchor="ctr"/>
+          <a:lstStyle/>
+          <a:p>
+            <a:pPr algn="ctr"/>
+            <a:endParaRPr lang="zh-TW" altLang="en-US"/>
+          </a:p>
+        </p:txBody>
+      </p:sp>
+      <p:sp>
+        <p:nvSpPr>
+          <p:cNvPr id="10" name="矩形: 圓角 9">
+            <a:extLst>
+              <a:ext uri="{FF2B5EF4-FFF2-40B4-BE49-F238E27FC236}">
+                <a16:creationId xmlns:a16="http://schemas.microsoft.com/office/drawing/2014/main" id="{57BCA36E-B7CB-4936-80D0-1E4B492F2090}"/>
+              </a:ext>
+            </a:extLst>
+          </p:cNvPr>
+          <p:cNvSpPr/>
+          <p:nvPr/>
+        </p:nvSpPr>
+        <p:spPr>
+          <a:xfrm>
+            <a:off x="2785929" y="1553911"/>
+            <a:ext cx="3161080" cy="351575"/>
+          </a:xfrm>
+          <a:prstGeom prst="roundRect">
+            <a:avLst/>
+          </a:prstGeom>
+          <a:noFill/>
+          <a:ln w="38100">
+            <a:solidFill>
+              <a:srgbClr val="FF0000"/>
+            </a:solidFill>
+          </a:ln>
+        </p:spPr>
+        <p:style>
+          <a:lnRef idx="2">
+            <a:schemeClr val="accent1">
+              <a:shade val="50000"/>
+            </a:schemeClr>
+          </a:lnRef>
+          <a:fillRef idx="1">
+            <a:schemeClr val="accent1"/>
+          </a:fillRef>
+          <a:effectRef idx="0">
+            <a:schemeClr val="accent1"/>
+          </a:effectRef>
+          <a:fontRef idx="minor">
+            <a:schemeClr val="lt1"/>
+          </a:fontRef>
+        </p:style>
+        <p:txBody>
+          <a:bodyPr rtlCol="0" anchor="ctr"/>
+          <a:lstStyle/>
+          <a:p>
+            <a:pPr algn="ctr"/>
+            <a:endParaRPr lang="zh-TW" altLang="en-US"/>
+          </a:p>
+        </p:txBody>
+      </p:sp>
+      <p:sp>
+        <p:nvSpPr>
+          <p:cNvPr id="11" name="矩形: 圓角 10">
+            <a:extLst>
+              <a:ext uri="{FF2B5EF4-FFF2-40B4-BE49-F238E27FC236}">
+                <a16:creationId xmlns:a16="http://schemas.microsoft.com/office/drawing/2014/main" id="{2432E27E-926D-4A36-8AAC-0E1E581703E7}"/>
+              </a:ext>
+            </a:extLst>
+          </p:cNvPr>
+          <p:cNvSpPr/>
+          <p:nvPr/>
+        </p:nvSpPr>
+        <p:spPr>
+          <a:xfrm>
+            <a:off x="2785929" y="2472678"/>
+            <a:ext cx="3161080" cy="351575"/>
+          </a:xfrm>
+          <a:prstGeom prst="roundRect">
+            <a:avLst/>
+          </a:prstGeom>
+          <a:noFill/>
+          <a:ln w="38100">
+            <a:solidFill>
+              <a:srgbClr val="FF0000"/>
+            </a:solidFill>
+          </a:ln>
+        </p:spPr>
+        <p:style>
+          <a:lnRef idx="2">
+            <a:schemeClr val="accent1">
+              <a:shade val="50000"/>
+            </a:schemeClr>
+          </a:lnRef>
+          <a:fillRef idx="1">
+            <a:schemeClr val="accent1"/>
+          </a:fillRef>
+          <a:effectRef idx="0">
+            <a:schemeClr val="accent1"/>
+          </a:effectRef>
+          <a:fontRef idx="minor">
+            <a:schemeClr val="lt1"/>
+          </a:fontRef>
+        </p:style>
+        <p:txBody>
+          <a:bodyPr rtlCol="0" anchor="ctr"/>
+          <a:lstStyle/>
+          <a:p>
+            <a:pPr algn="ctr"/>
+            <a:endParaRPr lang="zh-TW" altLang="en-US"/>
+          </a:p>
+        </p:txBody>
+      </p:sp>
+    </p:spTree>
+    <p:extLst>
+      <p:ext uri="{BB962C8B-B14F-4D97-AF65-F5344CB8AC3E}">
+        <p14:creationId xmlns:p14="http://schemas.microsoft.com/office/powerpoint/2010/main" val="2056787377"/>
+      </p:ext>
+    </p:extLst>
+  </p:cSld>
+  <p:clrMapOvr>
+    <a:masterClrMapping/>
+  </p:clrMapOvr>
+</p:sld>
+</file>
+
+<file path=ppt/slides/slide22.xml><?xml version="1.0" encoding="utf-8"?>
+<p:sld xmlns:a="http://schemas.openxmlformats.org/drawingml/2006/main" xmlns:r="http://schemas.openxmlformats.org/officeDocument/2006/relationships" xmlns:p="http://schemas.openxmlformats.org/presentationml/2006/main">
+  <p:cSld>
+    <p:spTree>
+      <p:nvGrpSpPr>
+        <p:cNvPr id="1" name=""/>
+        <p:cNvGrpSpPr/>
+        <p:nvPr/>
+      </p:nvGrpSpPr>
+      <p:grpSpPr>
+        <a:xfrm>
+          <a:off x="0" y="0"/>
+          <a:ext cx="0" cy="0"/>
+          <a:chOff x="0" y="0"/>
+          <a:chExt cx="0" cy="0"/>
+        </a:xfrm>
+      </p:grpSpPr>
+      <p:pic>
+        <p:nvPicPr>
+          <p:cNvPr id="5" name="圖片 4">
+            <a:extLst>
+              <a:ext uri="{FF2B5EF4-FFF2-40B4-BE49-F238E27FC236}">
+                <a16:creationId xmlns:a16="http://schemas.microsoft.com/office/drawing/2014/main" id="{A56FCDB2-4F54-4D8A-AF34-0EAD42A027C7}"/>
+              </a:ext>
+            </a:extLst>
+          </p:cNvPr>
+          <p:cNvPicPr>
+            <a:picLocks noChangeAspect="1"/>
+          </p:cNvPicPr>
+          <p:nvPr/>
+        </p:nvPicPr>
+        <p:blipFill>
+          <a:blip r:embed="rId2"/>
+          <a:stretch>
+            <a:fillRect/>
+          </a:stretch>
+        </p:blipFill>
+        <p:spPr>
+          <a:xfrm>
+            <a:off x="3467100" y="2876550"/>
+            <a:ext cx="5257800" cy="1104900"/>
+          </a:xfrm>
+          <a:prstGeom prst="rect">
+            <a:avLst/>
+          </a:prstGeom>
+        </p:spPr>
+      </p:pic>
+      <p:sp>
+        <p:nvSpPr>
+          <p:cNvPr id="6" name="矩形: 圓角 5">
+            <a:extLst>
+              <a:ext uri="{FF2B5EF4-FFF2-40B4-BE49-F238E27FC236}">
+                <a16:creationId xmlns:a16="http://schemas.microsoft.com/office/drawing/2014/main" id="{9AAAB68A-B062-4644-B824-F97D9A6202B3}"/>
+              </a:ext>
+            </a:extLst>
+          </p:cNvPr>
+          <p:cNvSpPr/>
+          <p:nvPr/>
+        </p:nvSpPr>
+        <p:spPr>
+          <a:xfrm>
+            <a:off x="3483879" y="3637501"/>
+            <a:ext cx="341502" cy="293615"/>
+          </a:xfrm>
+          <a:prstGeom prst="roundRect">
+            <a:avLst/>
+          </a:prstGeom>
+          <a:noFill/>
+          <a:ln w="38100">
+            <a:solidFill>
+              <a:srgbClr val="FF0000"/>
+            </a:solidFill>
+          </a:ln>
+        </p:spPr>
+        <p:style>
+          <a:lnRef idx="2">
+            <a:schemeClr val="accent1">
+              <a:shade val="50000"/>
+            </a:schemeClr>
+          </a:lnRef>
+          <a:fillRef idx="1">
+            <a:schemeClr val="accent1"/>
+          </a:fillRef>
+          <a:effectRef idx="0">
+            <a:schemeClr val="accent1"/>
+          </a:effectRef>
+          <a:fontRef idx="minor">
+            <a:schemeClr val="lt1"/>
+          </a:fontRef>
+        </p:style>
+        <p:txBody>
+          <a:bodyPr rtlCol="0" anchor="ctr"/>
+          <a:lstStyle/>
+          <a:p>
+            <a:pPr algn="ctr"/>
+            <a:endParaRPr lang="zh-TW" altLang="en-US"/>
+          </a:p>
+        </p:txBody>
+      </p:sp>
+      <p:sp>
+        <p:nvSpPr>
+          <p:cNvPr id="4" name="文字方塊 3">
+            <a:extLst>
+              <a:ext uri="{FF2B5EF4-FFF2-40B4-BE49-F238E27FC236}">
+                <a16:creationId xmlns:a16="http://schemas.microsoft.com/office/drawing/2014/main" id="{D1C52B31-C935-4BAA-9DFE-D7D04A2F9D60}"/>
+              </a:ext>
+            </a:extLst>
+          </p:cNvPr>
+          <p:cNvSpPr txBox="1"/>
+          <p:nvPr/>
+        </p:nvSpPr>
+        <p:spPr>
+          <a:xfrm>
+            <a:off x="4219400" y="254204"/>
+            <a:ext cx="3753200" cy="584775"/>
+          </a:xfrm>
+          <a:prstGeom prst="rect">
+            <a:avLst/>
+          </a:prstGeom>
+          <a:noFill/>
+        </p:spPr>
+        <p:txBody>
+          <a:bodyPr wrap="square" rtlCol="0">
+            <a:spAutoFit/>
+          </a:bodyPr>
+          <a:lstStyle/>
+          <a:p>
+            <a:r>
+              <a:rPr lang="en-US" altLang="zh-TW" sz="3200" dirty="0"/>
+              <a:t>Change post max size</a:t>
+            </a:r>
+            <a:endParaRPr lang="zh-TW" altLang="en-US" sz="3200" dirty="0"/>
+          </a:p>
+        </p:txBody>
+      </p:sp>
+    </p:spTree>
+    <p:extLst>
+      <p:ext uri="{BB962C8B-B14F-4D97-AF65-F5344CB8AC3E}">
+        <p14:creationId xmlns:p14="http://schemas.microsoft.com/office/powerpoint/2010/main" val="2930486347"/>
+      </p:ext>
+    </p:extLst>
+  </p:cSld>
+  <p:clrMapOvr>
+    <a:masterClrMapping/>
+  </p:clrMapOvr>
+</p:sld>
+</file>
+
+<file path=ppt/slides/slide23.xml><?xml version="1.0" encoding="utf-8"?>
+<p:sld xmlns:a="http://schemas.openxmlformats.org/drawingml/2006/main" xmlns:r="http://schemas.openxmlformats.org/officeDocument/2006/relationships" xmlns:p="http://schemas.openxmlformats.org/presentationml/2006/main">
+  <p:cSld>
+    <p:spTree>
+      <p:nvGrpSpPr>
+        <p:cNvPr id="1" name=""/>
+        <p:cNvGrpSpPr/>
+        <p:nvPr/>
+      </p:nvGrpSpPr>
+      <p:grpSpPr>
+        <a:xfrm>
+          <a:off x="0" y="0"/>
+          <a:ext cx="0" cy="0"/>
+          <a:chOff x="0" y="0"/>
+          <a:chExt cx="0" cy="0"/>
+        </a:xfrm>
+      </p:grpSpPr>
+      <p:pic>
+        <p:nvPicPr>
+          <p:cNvPr id="5" name="圖片 4">
+            <a:extLst>
+              <a:ext uri="{FF2B5EF4-FFF2-40B4-BE49-F238E27FC236}">
+                <a16:creationId xmlns:a16="http://schemas.microsoft.com/office/drawing/2014/main" id="{F99FE51C-FF2F-44E7-91D7-8FDB6015036A}"/>
+              </a:ext>
+            </a:extLst>
+          </p:cNvPr>
+          <p:cNvPicPr>
+            <a:picLocks noChangeAspect="1"/>
+          </p:cNvPicPr>
+          <p:nvPr/>
+        </p:nvPicPr>
+        <p:blipFill>
+          <a:blip r:embed="rId2"/>
+          <a:stretch>
+            <a:fillRect/>
+          </a:stretch>
+        </p:blipFill>
+        <p:spPr>
+          <a:xfrm>
+            <a:off x="3543300" y="2876550"/>
+            <a:ext cx="5105400" cy="1104900"/>
+          </a:xfrm>
+          <a:prstGeom prst="rect">
+            <a:avLst/>
+          </a:prstGeom>
+        </p:spPr>
+      </p:pic>
+      <p:sp>
+        <p:nvSpPr>
+          <p:cNvPr id="6" name="矩形: 圓角 5">
+            <a:extLst>
+              <a:ext uri="{FF2B5EF4-FFF2-40B4-BE49-F238E27FC236}">
+                <a16:creationId xmlns:a16="http://schemas.microsoft.com/office/drawing/2014/main" id="{A1593EDF-C8A6-487D-9A99-9883EC67DF72}"/>
+              </a:ext>
+            </a:extLst>
+          </p:cNvPr>
+          <p:cNvSpPr/>
+          <p:nvPr/>
+        </p:nvSpPr>
+        <p:spPr>
+          <a:xfrm>
+            <a:off x="3551689" y="3662668"/>
+            <a:ext cx="1146146" cy="293615"/>
+          </a:xfrm>
+          <a:prstGeom prst="roundRect">
+            <a:avLst/>
+          </a:prstGeom>
+          <a:noFill/>
+          <a:ln w="38100">
+            <a:solidFill>
+              <a:srgbClr val="FF0000"/>
+            </a:solidFill>
+          </a:ln>
+        </p:spPr>
+        <p:style>
+          <a:lnRef idx="2">
+            <a:schemeClr val="accent1">
+              <a:shade val="50000"/>
+            </a:schemeClr>
+          </a:lnRef>
+          <a:fillRef idx="1">
+            <a:schemeClr val="accent1"/>
+          </a:fillRef>
+          <a:effectRef idx="0">
+            <a:schemeClr val="accent1"/>
+          </a:effectRef>
+          <a:fontRef idx="minor">
+            <a:schemeClr val="lt1"/>
+          </a:fontRef>
+        </p:style>
+        <p:txBody>
+          <a:bodyPr rtlCol="0" anchor="ctr"/>
+          <a:lstStyle/>
+          <a:p>
+            <a:pPr algn="ctr"/>
+            <a:endParaRPr lang="zh-TW" altLang="en-US"/>
+          </a:p>
+        </p:txBody>
+      </p:sp>
+    </p:spTree>
+    <p:extLst>
+      <p:ext uri="{BB962C8B-B14F-4D97-AF65-F5344CB8AC3E}">
+        <p14:creationId xmlns:p14="http://schemas.microsoft.com/office/powerpoint/2010/main" val="253038194"/>
+      </p:ext>
+    </p:extLst>
+  </p:cSld>
+  <p:clrMapOvr>
+    <a:masterClrMapping/>
+  </p:clrMapOvr>
+</p:sld>
+</file>
+
+<file path=ppt/slides/slide24.xml><?xml version="1.0" encoding="utf-8"?>
+<p:sld xmlns:a="http://schemas.openxmlformats.org/drawingml/2006/main" xmlns:r="http://schemas.openxmlformats.org/officeDocument/2006/relationships" xmlns:p="http://schemas.openxmlformats.org/presentationml/2006/main">
+  <p:cSld>
+    <p:spTree>
+      <p:nvGrpSpPr>
+        <p:cNvPr id="1" name=""/>
+        <p:cNvGrpSpPr/>
+        <p:nvPr/>
+      </p:nvGrpSpPr>
+      <p:grpSpPr>
+        <a:xfrm>
+          <a:off x="0" y="0"/>
+          <a:ext cx="0" cy="0"/>
+          <a:chOff x="0" y="0"/>
+          <a:chExt cx="0" cy="0"/>
+        </a:xfrm>
+      </p:grpSpPr>
+      <p:pic>
+        <p:nvPicPr>
+          <p:cNvPr id="5" name="圖片 4">
+            <a:extLst>
+              <a:ext uri="{FF2B5EF4-FFF2-40B4-BE49-F238E27FC236}">
+                <a16:creationId xmlns:a16="http://schemas.microsoft.com/office/drawing/2014/main" id="{BF835184-56BA-4226-952D-F3A69624364B}"/>
+              </a:ext>
+            </a:extLst>
+          </p:cNvPr>
+          <p:cNvPicPr>
+            <a:picLocks noChangeAspect="1"/>
+          </p:cNvPicPr>
+          <p:nvPr/>
+        </p:nvPicPr>
+        <p:blipFill>
+          <a:blip r:embed="rId2"/>
+          <a:stretch>
+            <a:fillRect/>
+          </a:stretch>
+        </p:blipFill>
+        <p:spPr>
+          <a:xfrm>
+            <a:off x="1985962" y="2843212"/>
+            <a:ext cx="8220075" cy="1171575"/>
+          </a:xfrm>
+          <a:prstGeom prst="rect">
+            <a:avLst/>
+          </a:prstGeom>
+        </p:spPr>
+      </p:pic>
+      <p:sp>
+        <p:nvSpPr>
+          <p:cNvPr id="6" name="矩形: 圓角 5">
+            <a:extLst>
+              <a:ext uri="{FF2B5EF4-FFF2-40B4-BE49-F238E27FC236}">
+                <a16:creationId xmlns:a16="http://schemas.microsoft.com/office/drawing/2014/main" id="{4BCCC6C0-BA8A-4050-A592-BD3964377396}"/>
+              </a:ext>
+            </a:extLst>
+          </p:cNvPr>
+          <p:cNvSpPr/>
+          <p:nvPr/>
+        </p:nvSpPr>
+        <p:spPr>
+          <a:xfrm>
+            <a:off x="1991084" y="3739103"/>
+            <a:ext cx="1940086" cy="233542"/>
+          </a:xfrm>
+          <a:prstGeom prst="roundRect">
+            <a:avLst/>
+          </a:prstGeom>
+          <a:noFill/>
+          <a:ln w="38100">
+            <a:solidFill>
+              <a:srgbClr val="FF0000"/>
+            </a:solidFill>
+          </a:ln>
+        </p:spPr>
+        <p:style>
+          <a:lnRef idx="2">
+            <a:schemeClr val="accent1">
+              <a:shade val="50000"/>
+            </a:schemeClr>
+          </a:lnRef>
+          <a:fillRef idx="1">
+            <a:schemeClr val="accent1"/>
+          </a:fillRef>
+          <a:effectRef idx="0">
+            <a:schemeClr val="accent1"/>
+          </a:effectRef>
+          <a:fontRef idx="minor">
+            <a:schemeClr val="lt1"/>
+          </a:fontRef>
+        </p:style>
+        <p:txBody>
+          <a:bodyPr rtlCol="0" anchor="ctr"/>
+          <a:lstStyle/>
+          <a:p>
+            <a:pPr algn="ctr"/>
+            <a:endParaRPr lang="zh-TW" altLang="en-US"/>
+          </a:p>
+        </p:txBody>
+      </p:sp>
+    </p:spTree>
+    <p:extLst>
+      <p:ext uri="{BB962C8B-B14F-4D97-AF65-F5344CB8AC3E}">
+        <p14:creationId xmlns:p14="http://schemas.microsoft.com/office/powerpoint/2010/main" val="4149495371"/>
+      </p:ext>
+    </p:extLst>
+  </p:cSld>
+  <p:clrMapOvr>
+    <a:masterClrMapping/>
+  </p:clrMapOvr>
+</p:sld>
+</file>
+
+<file path=ppt/slides/slide25.xml><?xml version="1.0" encoding="utf-8"?>
+<p:sld xmlns:a="http://schemas.openxmlformats.org/drawingml/2006/main" xmlns:r="http://schemas.openxmlformats.org/officeDocument/2006/relationships" xmlns:p="http://schemas.openxmlformats.org/presentationml/2006/main">
+  <p:cSld>
+    <p:spTree>
+      <p:nvGrpSpPr>
+        <p:cNvPr id="1" name=""/>
+        <p:cNvGrpSpPr/>
+        <p:nvPr/>
+      </p:nvGrpSpPr>
+      <p:grpSpPr>
+        <a:xfrm>
+          <a:off x="0" y="0"/>
+          <a:ext cx="0" cy="0"/>
+          <a:chOff x="0" y="0"/>
+          <a:chExt cx="0" cy="0"/>
+        </a:xfrm>
+      </p:grpSpPr>
+      <p:pic>
+        <p:nvPicPr>
+          <p:cNvPr id="5" name="圖片 4">
+            <a:extLst>
+              <a:ext uri="{FF2B5EF4-FFF2-40B4-BE49-F238E27FC236}">
+                <a16:creationId xmlns:a16="http://schemas.microsoft.com/office/drawing/2014/main" id="{FE58888C-E7CE-4F83-A322-A2448D82CDEC}"/>
+              </a:ext>
+            </a:extLst>
+          </p:cNvPr>
+          <p:cNvPicPr>
+            <a:picLocks noChangeAspect="1"/>
+          </p:cNvPicPr>
+          <p:nvPr/>
+        </p:nvPicPr>
+        <p:blipFill>
+          <a:blip r:embed="rId2"/>
+          <a:stretch>
+            <a:fillRect/>
+          </a:stretch>
+        </p:blipFill>
+        <p:spPr>
+          <a:xfrm>
+            <a:off x="1973709" y="2474119"/>
+            <a:ext cx="8244582" cy="1909762"/>
+          </a:xfrm>
+          <a:prstGeom prst="rect">
+            <a:avLst/>
+          </a:prstGeom>
+        </p:spPr>
+      </p:pic>
+      <p:sp>
+        <p:nvSpPr>
+          <p:cNvPr id="6" name="矩形: 圓角 5">
+            <a:extLst>
+              <a:ext uri="{FF2B5EF4-FFF2-40B4-BE49-F238E27FC236}">
+                <a16:creationId xmlns:a16="http://schemas.microsoft.com/office/drawing/2014/main" id="{9B8B1198-CA6D-4E5A-84E4-4ADD25DB489C}"/>
+              </a:ext>
+            </a:extLst>
+          </p:cNvPr>
+          <p:cNvSpPr/>
+          <p:nvPr/>
+        </p:nvSpPr>
+        <p:spPr>
+          <a:xfrm>
+            <a:off x="1992759" y="3924300"/>
+            <a:ext cx="826641" cy="410295"/>
+          </a:xfrm>
+          <a:prstGeom prst="roundRect">
+            <a:avLst/>
+          </a:prstGeom>
+          <a:noFill/>
+          <a:ln w="38100">
+            <a:solidFill>
+              <a:srgbClr val="FF0000"/>
+            </a:solidFill>
+          </a:ln>
+        </p:spPr>
+        <p:style>
+          <a:lnRef idx="2">
+            <a:schemeClr val="accent1">
+              <a:shade val="50000"/>
+            </a:schemeClr>
+          </a:lnRef>
+          <a:fillRef idx="1">
+            <a:schemeClr val="accent1"/>
+          </a:fillRef>
+          <a:effectRef idx="0">
+            <a:schemeClr val="accent1"/>
+          </a:effectRef>
+          <a:fontRef idx="minor">
+            <a:schemeClr val="lt1"/>
+          </a:fontRef>
+        </p:style>
+        <p:txBody>
+          <a:bodyPr rtlCol="0" anchor="ctr"/>
+          <a:lstStyle/>
+          <a:p>
+            <a:pPr algn="ctr"/>
+            <a:endParaRPr lang="zh-TW" altLang="en-US"/>
+          </a:p>
+        </p:txBody>
+      </p:sp>
+    </p:spTree>
+    <p:extLst>
+      <p:ext uri="{BB962C8B-B14F-4D97-AF65-F5344CB8AC3E}">
+        <p14:creationId xmlns:p14="http://schemas.microsoft.com/office/powerpoint/2010/main" val="4022953045"/>
+      </p:ext>
+    </p:extLst>
+  </p:cSld>
+  <p:clrMapOvr>
+    <a:masterClrMapping/>
+  </p:clrMapOvr>
+</p:sld>
+</file>
+
+<file path=ppt/slides/slide26.xml><?xml version="1.0" encoding="utf-8"?>
+<p:sld xmlns:a="http://schemas.openxmlformats.org/drawingml/2006/main" xmlns:r="http://schemas.openxmlformats.org/officeDocument/2006/relationships" xmlns:p="http://schemas.openxmlformats.org/presentationml/2006/main">
+  <p:cSld>
+    <p:spTree>
+      <p:nvGrpSpPr>
+        <p:cNvPr id="1" name=""/>
+        <p:cNvGrpSpPr/>
+        <p:nvPr/>
+      </p:nvGrpSpPr>
+      <p:grpSpPr>
+        <a:xfrm>
+          <a:off x="0" y="0"/>
+          <a:ext cx="0" cy="0"/>
+          <a:chOff x="0" y="0"/>
+          <a:chExt cx="0" cy="0"/>
+        </a:xfrm>
+      </p:grpSpPr>
+      <p:pic>
+        <p:nvPicPr>
+          <p:cNvPr id="5" name="圖片 4">
+            <a:extLst>
+              <a:ext uri="{FF2B5EF4-FFF2-40B4-BE49-F238E27FC236}">
+                <a16:creationId xmlns:a16="http://schemas.microsoft.com/office/drawing/2014/main" id="{97F718F3-10E1-4D2B-B0D5-7D72F1E46843}"/>
+              </a:ext>
+            </a:extLst>
+          </p:cNvPr>
+          <p:cNvPicPr>
+            <a:picLocks noChangeAspect="1"/>
+          </p:cNvPicPr>
+          <p:nvPr/>
+        </p:nvPicPr>
+        <p:blipFill>
+          <a:blip r:embed="rId2"/>
+          <a:stretch>
+            <a:fillRect/>
+          </a:stretch>
+        </p:blipFill>
+        <p:spPr>
+          <a:xfrm>
+            <a:off x="315377" y="787039"/>
+            <a:ext cx="11561246" cy="5283922"/>
+          </a:xfrm>
+          <a:prstGeom prst="rect">
+            <a:avLst/>
+          </a:prstGeom>
+          <a:ln>
+            <a:solidFill>
+              <a:schemeClr val="tx1"/>
+            </a:solidFill>
+          </a:ln>
+        </p:spPr>
+      </p:pic>
+      <p:sp>
+        <p:nvSpPr>
+          <p:cNvPr id="6" name="矩形: 圓角 5">
+            <a:extLst>
+              <a:ext uri="{FF2B5EF4-FFF2-40B4-BE49-F238E27FC236}">
+                <a16:creationId xmlns:a16="http://schemas.microsoft.com/office/drawing/2014/main" id="{5135E074-84A2-41AE-865D-5EF01ACEBBD2}"/>
+              </a:ext>
+            </a:extLst>
+          </p:cNvPr>
+          <p:cNvSpPr/>
+          <p:nvPr/>
+        </p:nvSpPr>
+        <p:spPr>
+          <a:xfrm>
+            <a:off x="428623" y="1512684"/>
+            <a:ext cx="1509234" cy="257393"/>
+          </a:xfrm>
+          <a:prstGeom prst="roundRect">
+            <a:avLst/>
+          </a:prstGeom>
+          <a:noFill/>
+          <a:ln w="38100">
+            <a:solidFill>
+              <a:srgbClr val="FF0000"/>
+            </a:solidFill>
+          </a:ln>
+        </p:spPr>
+        <p:style>
+          <a:lnRef idx="2">
+            <a:schemeClr val="accent1">
+              <a:shade val="50000"/>
+            </a:schemeClr>
+          </a:lnRef>
+          <a:fillRef idx="1">
+            <a:schemeClr val="accent1"/>
+          </a:fillRef>
+          <a:effectRef idx="0">
+            <a:schemeClr val="accent1"/>
+          </a:effectRef>
+          <a:fontRef idx="minor">
+            <a:schemeClr val="lt1"/>
+          </a:fontRef>
+        </p:style>
+        <p:txBody>
+          <a:bodyPr rtlCol="0" anchor="ctr"/>
+          <a:lstStyle/>
+          <a:p>
+            <a:pPr algn="ctr"/>
+            <a:endParaRPr lang="zh-TW" altLang="en-US"/>
+          </a:p>
+        </p:txBody>
+      </p:sp>
+      <p:sp>
+        <p:nvSpPr>
+          <p:cNvPr id="7" name="文字方塊 6">
+            <a:extLst>
+              <a:ext uri="{FF2B5EF4-FFF2-40B4-BE49-F238E27FC236}">
+                <a16:creationId xmlns:a16="http://schemas.microsoft.com/office/drawing/2014/main" id="{8938EAC4-89F1-48D0-9BA8-3E0376636C7D}"/>
+              </a:ext>
+            </a:extLst>
+          </p:cNvPr>
+          <p:cNvSpPr txBox="1"/>
+          <p:nvPr/>
+        </p:nvSpPr>
+        <p:spPr>
+          <a:xfrm>
+            <a:off x="4838350" y="92279"/>
+            <a:ext cx="2515299" cy="584775"/>
+          </a:xfrm>
+          <a:prstGeom prst="rect">
+            <a:avLst/>
+          </a:prstGeom>
+          <a:noFill/>
+        </p:spPr>
+        <p:txBody>
+          <a:bodyPr wrap="square" rtlCol="0">
+            <a:spAutoFit/>
+          </a:bodyPr>
+          <a:lstStyle/>
+          <a:p>
+            <a:r>
+              <a:rPr lang="en-US" altLang="zh-TW" sz="3200" dirty="0"/>
+              <a:t>Upload Video</a:t>
+            </a:r>
+            <a:endParaRPr lang="zh-TW" altLang="en-US" sz="3200" dirty="0"/>
+          </a:p>
+        </p:txBody>
+      </p:sp>
+    </p:spTree>
+    <p:extLst>
+      <p:ext uri="{BB962C8B-B14F-4D97-AF65-F5344CB8AC3E}">
+        <p14:creationId xmlns:p14="http://schemas.microsoft.com/office/powerpoint/2010/main" val="3646072802"/>
+      </p:ext>
+    </p:extLst>
+  </p:cSld>
+  <p:clrMapOvr>
+    <a:masterClrMapping/>
+  </p:clrMapOvr>
+</p:sld>
+</file>
+
+<file path=ppt/slides/slide27.xml><?xml version="1.0" encoding="utf-8"?>
+<p:sld xmlns:a="http://schemas.openxmlformats.org/drawingml/2006/main" xmlns:r="http://schemas.openxmlformats.org/officeDocument/2006/relationships" xmlns:p="http://schemas.openxmlformats.org/presentationml/2006/main">
+  <p:cSld>
+    <p:spTree>
+      <p:nvGrpSpPr>
+        <p:cNvPr id="1" name=""/>
+        <p:cNvGrpSpPr/>
+        <p:nvPr/>
+      </p:nvGrpSpPr>
+      <p:grpSpPr>
+        <a:xfrm>
+          <a:off x="0" y="0"/>
+          <a:ext cx="0" cy="0"/>
+          <a:chOff x="0" y="0"/>
+          <a:chExt cx="0" cy="0"/>
+        </a:xfrm>
+      </p:grpSpPr>
+      <p:pic>
+        <p:nvPicPr>
+          <p:cNvPr id="5" name="圖片 4">
+            <a:extLst>
+              <a:ext uri="{FF2B5EF4-FFF2-40B4-BE49-F238E27FC236}">
+                <a16:creationId xmlns:a16="http://schemas.microsoft.com/office/drawing/2014/main" id="{E793BD07-E4E7-4894-8A9E-E891F9333A87}"/>
+              </a:ext>
+            </a:extLst>
+          </p:cNvPr>
+          <p:cNvPicPr>
+            <a:picLocks noChangeAspect="1"/>
+          </p:cNvPicPr>
+          <p:nvPr/>
+        </p:nvPicPr>
+        <p:blipFill>
+          <a:blip r:embed="rId2"/>
+          <a:stretch>
+            <a:fillRect/>
+          </a:stretch>
+        </p:blipFill>
+        <p:spPr>
+          <a:xfrm>
+            <a:off x="104862" y="1440332"/>
+            <a:ext cx="11982275" cy="3977336"/>
+          </a:xfrm>
+          <a:prstGeom prst="rect">
+            <a:avLst/>
+          </a:prstGeom>
+          <a:ln>
+            <a:solidFill>
+              <a:schemeClr val="tx1"/>
+            </a:solidFill>
+          </a:ln>
+        </p:spPr>
+      </p:pic>
+      <p:sp>
+        <p:nvSpPr>
+          <p:cNvPr id="6" name="矩形: 圓角 5">
+            <a:extLst>
+              <a:ext uri="{FF2B5EF4-FFF2-40B4-BE49-F238E27FC236}">
+                <a16:creationId xmlns:a16="http://schemas.microsoft.com/office/drawing/2014/main" id="{E70233FC-AB1C-48DA-BDB8-781A8E1DD4FB}"/>
+              </a:ext>
+            </a:extLst>
+          </p:cNvPr>
+          <p:cNvSpPr/>
+          <p:nvPr/>
+        </p:nvSpPr>
+        <p:spPr>
+          <a:xfrm>
+            <a:off x="2072865" y="4622334"/>
+            <a:ext cx="527722" cy="192947"/>
+          </a:xfrm>
+          <a:prstGeom prst="roundRect">
+            <a:avLst/>
+          </a:prstGeom>
+          <a:noFill/>
+          <a:ln w="38100">
+            <a:solidFill>
+              <a:srgbClr val="FF0000"/>
+            </a:solidFill>
+          </a:ln>
+        </p:spPr>
+        <p:style>
+          <a:lnRef idx="2">
+            <a:schemeClr val="accent1">
+              <a:shade val="50000"/>
+            </a:schemeClr>
+          </a:lnRef>
+          <a:fillRef idx="1">
+            <a:schemeClr val="accent1"/>
+          </a:fillRef>
+          <a:effectRef idx="0">
+            <a:schemeClr val="accent1"/>
+          </a:effectRef>
+          <a:fontRef idx="minor">
+            <a:schemeClr val="lt1"/>
+          </a:fontRef>
+        </p:style>
+        <p:txBody>
+          <a:bodyPr rtlCol="0" anchor="ctr"/>
+          <a:lstStyle/>
+          <a:p>
+            <a:pPr algn="ctr"/>
+            <a:endParaRPr lang="zh-TW" altLang="en-US"/>
+          </a:p>
+        </p:txBody>
+      </p:sp>
+    </p:spTree>
+    <p:extLst>
+      <p:ext uri="{BB962C8B-B14F-4D97-AF65-F5344CB8AC3E}">
+        <p14:creationId xmlns:p14="http://schemas.microsoft.com/office/powerpoint/2010/main" val="1049622188"/>
+      </p:ext>
+    </p:extLst>
+  </p:cSld>
+  <p:clrMapOvr>
+    <a:masterClrMapping/>
+  </p:clrMapOvr>
+</p:sld>
+</file>
+
+<file path=ppt/slides/slide28.xml><?xml version="1.0" encoding="utf-8"?>
+<p:sld xmlns:a="http://schemas.openxmlformats.org/drawingml/2006/main" xmlns:r="http://schemas.openxmlformats.org/officeDocument/2006/relationships" xmlns:p="http://schemas.openxmlformats.org/presentationml/2006/main">
+  <p:cSld>
+    <p:spTree>
+      <p:nvGrpSpPr>
+        <p:cNvPr id="1" name=""/>
+        <p:cNvGrpSpPr/>
+        <p:nvPr/>
+      </p:nvGrpSpPr>
+      <p:grpSpPr>
+        <a:xfrm>
+          <a:off x="0" y="0"/>
+          <a:ext cx="0" cy="0"/>
+          <a:chOff x="0" y="0"/>
+          <a:chExt cx="0" cy="0"/>
+        </a:xfrm>
+      </p:grpSpPr>
+      <p:pic>
+        <p:nvPicPr>
+          <p:cNvPr id="5" name="圖片 4">
+            <a:extLst>
+              <a:ext uri="{FF2B5EF4-FFF2-40B4-BE49-F238E27FC236}">
+                <a16:creationId xmlns:a16="http://schemas.microsoft.com/office/drawing/2014/main" id="{708122AE-7637-4E3F-B3BD-95D5364BAE9E}"/>
+              </a:ext>
+            </a:extLst>
+          </p:cNvPr>
+          <p:cNvPicPr>
+            <a:picLocks noChangeAspect="1"/>
+          </p:cNvPicPr>
+          <p:nvPr/>
+        </p:nvPicPr>
+        <p:blipFill>
+          <a:blip r:embed="rId2"/>
+          <a:stretch>
+            <a:fillRect/>
+          </a:stretch>
+        </p:blipFill>
+        <p:spPr>
+          <a:xfrm>
+            <a:off x="98495" y="701832"/>
+            <a:ext cx="11995009" cy="5454334"/>
+          </a:xfrm>
+          <a:prstGeom prst="rect">
+            <a:avLst/>
+          </a:prstGeom>
+          <a:ln>
+            <a:solidFill>
+              <a:schemeClr val="tx1"/>
+            </a:solidFill>
+          </a:ln>
+        </p:spPr>
+      </p:pic>
+      <p:sp>
+        <p:nvSpPr>
+          <p:cNvPr id="6" name="矩形: 圓角 5">
+            <a:extLst>
+              <a:ext uri="{FF2B5EF4-FFF2-40B4-BE49-F238E27FC236}">
+                <a16:creationId xmlns:a16="http://schemas.microsoft.com/office/drawing/2014/main" id="{DFC61B8F-8854-4F46-99A3-8D1915E965E5}"/>
+              </a:ext>
+            </a:extLst>
+          </p:cNvPr>
+          <p:cNvSpPr/>
+          <p:nvPr/>
+        </p:nvSpPr>
+        <p:spPr>
+          <a:xfrm>
+            <a:off x="462178" y="2885813"/>
+            <a:ext cx="6005733" cy="293615"/>
+          </a:xfrm>
+          <a:prstGeom prst="roundRect">
+            <a:avLst/>
+          </a:prstGeom>
+          <a:noFill/>
+          <a:ln w="38100">
+            <a:solidFill>
+              <a:srgbClr val="FF0000"/>
+            </a:solidFill>
+          </a:ln>
+        </p:spPr>
+        <p:style>
+          <a:lnRef idx="2">
+            <a:schemeClr val="accent1">
+              <a:shade val="50000"/>
+            </a:schemeClr>
+          </a:lnRef>
+          <a:fillRef idx="1">
+            <a:schemeClr val="accent1"/>
+          </a:fillRef>
+          <a:effectRef idx="0">
+            <a:schemeClr val="accent1"/>
+          </a:effectRef>
+          <a:fontRef idx="minor">
+            <a:schemeClr val="lt1"/>
+          </a:fontRef>
+        </p:style>
+        <p:txBody>
+          <a:bodyPr rtlCol="0" anchor="ctr"/>
+          <a:lstStyle/>
+          <a:p>
+            <a:pPr algn="ctr"/>
+            <a:endParaRPr lang="zh-TW" altLang="en-US"/>
+          </a:p>
+        </p:txBody>
+      </p:sp>
+      <p:sp>
+        <p:nvSpPr>
+          <p:cNvPr id="7" name="矩形: 圓角 6">
+            <a:extLst>
+              <a:ext uri="{FF2B5EF4-FFF2-40B4-BE49-F238E27FC236}">
+                <a16:creationId xmlns:a16="http://schemas.microsoft.com/office/drawing/2014/main" id="{EE8CD9AA-ED3F-4F12-8863-D40828EE4BCA}"/>
+              </a:ext>
+            </a:extLst>
+          </p:cNvPr>
+          <p:cNvSpPr/>
+          <p:nvPr/>
+        </p:nvSpPr>
+        <p:spPr>
+          <a:xfrm>
+            <a:off x="462177" y="3282192"/>
+            <a:ext cx="6005733" cy="293615"/>
+          </a:xfrm>
+          <a:prstGeom prst="roundRect">
+            <a:avLst/>
+          </a:prstGeom>
+          <a:noFill/>
+          <a:ln w="38100">
+            <a:solidFill>
+              <a:srgbClr val="FF0000"/>
+            </a:solidFill>
+          </a:ln>
+        </p:spPr>
+        <p:style>
+          <a:lnRef idx="2">
+            <a:schemeClr val="accent1">
+              <a:shade val="50000"/>
+            </a:schemeClr>
+          </a:lnRef>
+          <a:fillRef idx="1">
+            <a:schemeClr val="accent1"/>
+          </a:fillRef>
+          <a:effectRef idx="0">
+            <a:schemeClr val="accent1"/>
+          </a:effectRef>
+          <a:fontRef idx="minor">
+            <a:schemeClr val="lt1"/>
+          </a:fontRef>
+        </p:style>
+        <p:txBody>
+          <a:bodyPr rtlCol="0" anchor="ctr"/>
+          <a:lstStyle/>
+          <a:p>
+            <a:pPr algn="ctr"/>
+            <a:endParaRPr lang="zh-TW" altLang="en-US"/>
+          </a:p>
+        </p:txBody>
+      </p:sp>
+      <p:sp>
+        <p:nvSpPr>
+          <p:cNvPr id="8" name="矩形: 圓角 7">
+            <a:extLst>
+              <a:ext uri="{FF2B5EF4-FFF2-40B4-BE49-F238E27FC236}">
+                <a16:creationId xmlns:a16="http://schemas.microsoft.com/office/drawing/2014/main" id="{75860204-1B5A-42C5-8E48-5F19A5FCF94F}"/>
+              </a:ext>
+            </a:extLst>
+          </p:cNvPr>
+          <p:cNvSpPr/>
+          <p:nvPr/>
+        </p:nvSpPr>
+        <p:spPr>
+          <a:xfrm>
+            <a:off x="462178" y="3712127"/>
+            <a:ext cx="3472260" cy="293615"/>
+          </a:xfrm>
+          <a:prstGeom prst="roundRect">
+            <a:avLst/>
+          </a:prstGeom>
+          <a:noFill/>
+          <a:ln w="38100">
+            <a:solidFill>
+              <a:srgbClr val="FF0000"/>
+            </a:solidFill>
+          </a:ln>
+        </p:spPr>
+        <p:style>
+          <a:lnRef idx="2">
+            <a:schemeClr val="accent1">
+              <a:shade val="50000"/>
+            </a:schemeClr>
+          </a:lnRef>
+          <a:fillRef idx="1">
+            <a:schemeClr val="accent1"/>
+          </a:fillRef>
+          <a:effectRef idx="0">
+            <a:schemeClr val="accent1"/>
+          </a:effectRef>
+          <a:fontRef idx="minor">
+            <a:schemeClr val="lt1"/>
+          </a:fontRef>
+        </p:style>
+        <p:txBody>
+          <a:bodyPr rtlCol="0" anchor="ctr"/>
+          <a:lstStyle/>
+          <a:p>
+            <a:pPr algn="ctr"/>
+            <a:endParaRPr lang="zh-TW" altLang="en-US"/>
+          </a:p>
+        </p:txBody>
+      </p:sp>
+      <p:sp>
+        <p:nvSpPr>
+          <p:cNvPr id="9" name="文字方塊 8">
+            <a:extLst>
+              <a:ext uri="{FF2B5EF4-FFF2-40B4-BE49-F238E27FC236}">
+                <a16:creationId xmlns:a16="http://schemas.microsoft.com/office/drawing/2014/main" id="{398F4CCC-D9CF-486D-8D2B-E079D00A59D2}"/>
+              </a:ext>
+            </a:extLst>
+          </p:cNvPr>
+          <p:cNvSpPr txBox="1"/>
+          <p:nvPr/>
+        </p:nvSpPr>
+        <p:spPr>
+          <a:xfrm>
+            <a:off x="7685824" y="2946254"/>
+            <a:ext cx="1349119" cy="646331"/>
+          </a:xfrm>
+          <a:prstGeom prst="rect">
+            <a:avLst/>
+          </a:prstGeom>
+          <a:noFill/>
+          <a:ln w="28575">
+            <a:solidFill>
+              <a:schemeClr val="tx1"/>
+            </a:solidFill>
+          </a:ln>
+        </p:spPr>
+        <p:txBody>
+          <a:bodyPr wrap="square" rtlCol="0">
+            <a:spAutoFit/>
+          </a:bodyPr>
+          <a:lstStyle/>
+          <a:p>
+            <a:r>
+              <a:rPr lang="zh-TW" altLang="en-US" dirty="0">
+                <a:solidFill>
+                  <a:srgbClr val="FF0000"/>
+                </a:solidFill>
+              </a:rPr>
+              <a:t>不能與之前的課程重複</a:t>
+            </a:r>
+          </a:p>
+        </p:txBody>
+      </p:sp>
+      <p:cxnSp>
+        <p:nvCxnSpPr>
+          <p:cNvPr id="11" name="接點: 肘形 10">
+            <a:extLst>
+              <a:ext uri="{FF2B5EF4-FFF2-40B4-BE49-F238E27FC236}">
+                <a16:creationId xmlns:a16="http://schemas.microsoft.com/office/drawing/2014/main" id="{1225FB17-7C0D-4493-9FC9-1B895FA3DE12}"/>
+              </a:ext>
+            </a:extLst>
+          </p:cNvPr>
+          <p:cNvCxnSpPr>
+            <a:cxnSpLocks/>
+            <a:stCxn id="6" idx="3"/>
+            <a:endCxn id="9" idx="1"/>
+          </p:cNvCxnSpPr>
+          <p:nvPr/>
+        </p:nvCxnSpPr>
+        <p:spPr>
+          <a:xfrm>
+            <a:off x="6467911" y="3032621"/>
+            <a:ext cx="1217913" cy="236799"/>
+          </a:xfrm>
+          <a:prstGeom prst="bentConnector3">
+            <a:avLst/>
+          </a:prstGeom>
+          <a:ln w="38100">
+            <a:solidFill>
+              <a:srgbClr val="FF0000"/>
+            </a:solidFill>
+            <a:tailEnd type="triangle"/>
+          </a:ln>
+        </p:spPr>
+        <p:style>
+          <a:lnRef idx="1">
+            <a:schemeClr val="accent1"/>
+          </a:lnRef>
+          <a:fillRef idx="0">
+            <a:schemeClr val="accent1"/>
+          </a:fillRef>
+          <a:effectRef idx="0">
+            <a:schemeClr val="accent1"/>
+          </a:effectRef>
+          <a:fontRef idx="minor">
+            <a:schemeClr val="tx1"/>
+          </a:fontRef>
+        </p:style>
+      </p:cxnSp>
+      <p:cxnSp>
+        <p:nvCxnSpPr>
+          <p:cNvPr id="12" name="接點: 肘形 11">
+            <a:extLst>
+              <a:ext uri="{FF2B5EF4-FFF2-40B4-BE49-F238E27FC236}">
+                <a16:creationId xmlns:a16="http://schemas.microsoft.com/office/drawing/2014/main" id="{CBD93FFA-598D-4706-AB77-8BF6E4197BC7}"/>
+              </a:ext>
+            </a:extLst>
+          </p:cNvPr>
+          <p:cNvCxnSpPr>
+            <a:cxnSpLocks/>
+            <a:stCxn id="7" idx="3"/>
+            <a:endCxn id="9" idx="1"/>
+          </p:cNvCxnSpPr>
+          <p:nvPr/>
+        </p:nvCxnSpPr>
+        <p:spPr>
+          <a:xfrm flipV="1">
+            <a:off x="6467910" y="3269420"/>
+            <a:ext cx="1217914" cy="159580"/>
+          </a:xfrm>
+          <a:prstGeom prst="bentConnector3">
+            <a:avLst/>
+          </a:prstGeom>
+          <a:ln w="38100">
+            <a:solidFill>
+              <a:srgbClr val="FF0000"/>
+            </a:solidFill>
+            <a:tailEnd type="triangle"/>
+          </a:ln>
+        </p:spPr>
+        <p:style>
+          <a:lnRef idx="1">
+            <a:schemeClr val="accent1"/>
+          </a:lnRef>
+          <a:fillRef idx="0">
+            <a:schemeClr val="accent1"/>
+          </a:fillRef>
+          <a:effectRef idx="0">
+            <a:schemeClr val="accent1"/>
+          </a:effectRef>
+          <a:fontRef idx="minor">
+            <a:schemeClr val="tx1"/>
+          </a:fontRef>
+        </p:style>
+      </p:cxnSp>
+    </p:spTree>
+    <p:extLst>
+      <p:ext uri="{BB962C8B-B14F-4D97-AF65-F5344CB8AC3E}">
+        <p14:creationId xmlns:p14="http://schemas.microsoft.com/office/powerpoint/2010/main" val="745432729"/>
+      </p:ext>
+    </p:extLst>
+  </p:cSld>
+  <p:clrMapOvr>
+    <a:masterClrMapping/>
+  </p:clrMapOvr>
+</p:sld>
+</file>
+
+<file path=ppt/slides/slide29.xml><?xml version="1.0" encoding="utf-8"?>
+<p:sld xmlns:a="http://schemas.openxmlformats.org/drawingml/2006/main" xmlns:r="http://schemas.openxmlformats.org/officeDocument/2006/relationships" xmlns:p="http://schemas.openxmlformats.org/presentationml/2006/main">
+  <p:cSld>
+    <p:spTree>
+      <p:nvGrpSpPr>
+        <p:cNvPr id="1" name=""/>
+        <p:cNvGrpSpPr/>
+        <p:nvPr/>
+      </p:nvGrpSpPr>
+      <p:grpSpPr>
+        <a:xfrm>
+          <a:off x="0" y="0"/>
+          <a:ext cx="0" cy="0"/>
+          <a:chOff x="0" y="0"/>
+          <a:chExt cx="0" cy="0"/>
+        </a:xfrm>
+      </p:grpSpPr>
+      <p:pic>
+        <p:nvPicPr>
+          <p:cNvPr id="5" name="圖片 4">
+            <a:extLst>
+              <a:ext uri="{FF2B5EF4-FFF2-40B4-BE49-F238E27FC236}">
+                <a16:creationId xmlns:a16="http://schemas.microsoft.com/office/drawing/2014/main" id="{37D6F8BA-E9DF-49F2-A162-09C1A8894727}"/>
+              </a:ext>
+            </a:extLst>
+          </p:cNvPr>
+          <p:cNvPicPr>
+            <a:picLocks noChangeAspect="1"/>
+          </p:cNvPicPr>
+          <p:nvPr/>
+        </p:nvPicPr>
+        <p:blipFill>
+          <a:blip r:embed="rId2"/>
+          <a:stretch>
+            <a:fillRect/>
+          </a:stretch>
+        </p:blipFill>
+        <p:spPr>
+          <a:xfrm>
+            <a:off x="110606" y="1354231"/>
+            <a:ext cx="11970787" cy="4149537"/>
+          </a:xfrm>
+          <a:prstGeom prst="rect">
+            <a:avLst/>
+          </a:prstGeom>
+          <a:ln>
+            <a:solidFill>
+              <a:schemeClr val="tx1"/>
+            </a:solidFill>
+          </a:ln>
+        </p:spPr>
+      </p:pic>
+      <p:sp>
+        <p:nvSpPr>
+          <p:cNvPr id="6" name="矩形: 圓角 5">
+            <a:extLst>
+              <a:ext uri="{FF2B5EF4-FFF2-40B4-BE49-F238E27FC236}">
+                <a16:creationId xmlns:a16="http://schemas.microsoft.com/office/drawing/2014/main" id="{D592D94D-5290-4B76-BD0E-BCB7D8C9DA6B}"/>
+              </a:ext>
+            </a:extLst>
+          </p:cNvPr>
+          <p:cNvSpPr/>
+          <p:nvPr/>
+        </p:nvSpPr>
+        <p:spPr>
+          <a:xfrm>
+            <a:off x="4572784" y="5087921"/>
+            <a:ext cx="846504" cy="293615"/>
+          </a:xfrm>
+          <a:prstGeom prst="roundRect">
+            <a:avLst/>
+          </a:prstGeom>
+          <a:noFill/>
+          <a:ln w="38100">
+            <a:solidFill>
+              <a:srgbClr val="FF0000"/>
+            </a:solidFill>
+          </a:ln>
+        </p:spPr>
+        <p:style>
+          <a:lnRef idx="2">
+            <a:schemeClr val="accent1">
+              <a:shade val="50000"/>
+            </a:schemeClr>
+          </a:lnRef>
+          <a:fillRef idx="1">
+            <a:schemeClr val="accent1"/>
+          </a:fillRef>
+          <a:effectRef idx="0">
+            <a:schemeClr val="accent1"/>
+          </a:effectRef>
+          <a:fontRef idx="minor">
+            <a:schemeClr val="lt1"/>
+          </a:fontRef>
+        </p:style>
+        <p:txBody>
+          <a:bodyPr rtlCol="0" anchor="ctr"/>
+          <a:lstStyle/>
+          <a:p>
+            <a:pPr algn="ctr"/>
+            <a:endParaRPr lang="zh-TW" altLang="en-US"/>
+          </a:p>
+        </p:txBody>
+      </p:sp>
+    </p:spTree>
+    <p:extLst>
+      <p:ext uri="{BB962C8B-B14F-4D97-AF65-F5344CB8AC3E}">
+        <p14:creationId xmlns:p14="http://schemas.microsoft.com/office/powerpoint/2010/main" val="3531110037"/>
+      </p:ext>
+    </p:extLst>
+  </p:cSld>
+  <p:clrMapOvr>
+    <a:masterClrMapping/>
+  </p:clrMapOvr>
+</p:sld>
+</file>
+
 <file path=ppt/slides/slide3.xml><?xml version="1.0" encoding="utf-8"?>
 <p:sld xmlns:a="http://schemas.openxmlformats.org/drawingml/2006/main" xmlns:r="http://schemas.openxmlformats.org/officeDocument/2006/relationships" xmlns:p="http://schemas.openxmlformats.org/presentationml/2006/main">
   <p:cSld>
@@ -6076,6 +7663,1469 @@
     <p:extLst>
       <p:ext uri="{BB962C8B-B14F-4D97-AF65-F5344CB8AC3E}">
         <p14:creationId xmlns:p14="http://schemas.microsoft.com/office/powerpoint/2010/main" val="9523909"/>
+      </p:ext>
+    </p:extLst>
+  </p:cSld>
+  <p:clrMapOvr>
+    <a:masterClrMapping/>
+  </p:clrMapOvr>
+</p:sld>
+</file>
+
+<file path=ppt/slides/slide30.xml><?xml version="1.0" encoding="utf-8"?>
+<p:sld xmlns:a="http://schemas.openxmlformats.org/drawingml/2006/main" xmlns:r="http://schemas.openxmlformats.org/officeDocument/2006/relationships" xmlns:p="http://schemas.openxmlformats.org/presentationml/2006/main">
+  <p:cSld>
+    <p:spTree>
+      <p:nvGrpSpPr>
+        <p:cNvPr id="1" name=""/>
+        <p:cNvGrpSpPr/>
+        <p:nvPr/>
+      </p:nvGrpSpPr>
+      <p:grpSpPr>
+        <a:xfrm>
+          <a:off x="0" y="0"/>
+          <a:ext cx="0" cy="0"/>
+          <a:chOff x="0" y="0"/>
+          <a:chExt cx="0" cy="0"/>
+        </a:xfrm>
+      </p:grpSpPr>
+      <p:pic>
+        <p:nvPicPr>
+          <p:cNvPr id="5" name="圖片 4">
+            <a:extLst>
+              <a:ext uri="{FF2B5EF4-FFF2-40B4-BE49-F238E27FC236}">
+                <a16:creationId xmlns:a16="http://schemas.microsoft.com/office/drawing/2014/main" id="{F077B298-4432-44CF-8E70-7658814A766F}"/>
+              </a:ext>
+            </a:extLst>
+          </p:cNvPr>
+          <p:cNvPicPr>
+            <a:picLocks noChangeAspect="1"/>
+          </p:cNvPicPr>
+          <p:nvPr/>
+        </p:nvPicPr>
+        <p:blipFill>
+          <a:blip r:embed="rId2"/>
+          <a:stretch>
+            <a:fillRect/>
+          </a:stretch>
+        </p:blipFill>
+        <p:spPr>
+          <a:xfrm>
+            <a:off x="155196" y="932414"/>
+            <a:ext cx="11881607" cy="4993171"/>
+          </a:xfrm>
+          <a:prstGeom prst="rect">
+            <a:avLst/>
+          </a:prstGeom>
+          <a:ln>
+            <a:solidFill>
+              <a:schemeClr val="tx1"/>
+            </a:solidFill>
+          </a:ln>
+        </p:spPr>
+      </p:pic>
+      <p:sp>
+        <p:nvSpPr>
+          <p:cNvPr id="6" name="矩形: 圓角 5">
+            <a:extLst>
+              <a:ext uri="{FF2B5EF4-FFF2-40B4-BE49-F238E27FC236}">
+                <a16:creationId xmlns:a16="http://schemas.microsoft.com/office/drawing/2014/main" id="{D815710D-EFD0-497A-B3E7-DCABEFA61CCB}"/>
+              </a:ext>
+            </a:extLst>
+          </p:cNvPr>
+          <p:cNvSpPr/>
+          <p:nvPr/>
+        </p:nvSpPr>
+        <p:spPr>
+          <a:xfrm>
+            <a:off x="210508" y="1379987"/>
+            <a:ext cx="1534402" cy="293615"/>
+          </a:xfrm>
+          <a:prstGeom prst="roundRect">
+            <a:avLst/>
+          </a:prstGeom>
+          <a:noFill/>
+          <a:ln w="38100">
+            <a:solidFill>
+              <a:srgbClr val="FF0000"/>
+            </a:solidFill>
+          </a:ln>
+        </p:spPr>
+        <p:style>
+          <a:lnRef idx="2">
+            <a:schemeClr val="accent1">
+              <a:shade val="50000"/>
+            </a:schemeClr>
+          </a:lnRef>
+          <a:fillRef idx="1">
+            <a:schemeClr val="accent1"/>
+          </a:fillRef>
+          <a:effectRef idx="0">
+            <a:schemeClr val="accent1"/>
+          </a:effectRef>
+          <a:fontRef idx="minor">
+            <a:schemeClr val="lt1"/>
+          </a:fontRef>
+        </p:style>
+        <p:txBody>
+          <a:bodyPr rtlCol="0" anchor="ctr"/>
+          <a:lstStyle/>
+          <a:p>
+            <a:pPr algn="ctr"/>
+            <a:endParaRPr lang="zh-TW" altLang="en-US"/>
+          </a:p>
+        </p:txBody>
+      </p:sp>
+      <p:sp>
+        <p:nvSpPr>
+          <p:cNvPr id="7" name="矩形: 圓角 6">
+            <a:extLst>
+              <a:ext uri="{FF2B5EF4-FFF2-40B4-BE49-F238E27FC236}">
+                <a16:creationId xmlns:a16="http://schemas.microsoft.com/office/drawing/2014/main" id="{14078078-0D54-4393-8EE1-51AF511D34D8}"/>
+              </a:ext>
+            </a:extLst>
+          </p:cNvPr>
+          <p:cNvSpPr/>
+          <p:nvPr/>
+        </p:nvSpPr>
+        <p:spPr>
+          <a:xfrm>
+            <a:off x="10923250" y="3972186"/>
+            <a:ext cx="846504" cy="293615"/>
+          </a:xfrm>
+          <a:prstGeom prst="roundRect">
+            <a:avLst/>
+          </a:prstGeom>
+          <a:noFill/>
+          <a:ln w="38100">
+            <a:solidFill>
+              <a:srgbClr val="FF0000"/>
+            </a:solidFill>
+          </a:ln>
+        </p:spPr>
+        <p:style>
+          <a:lnRef idx="2">
+            <a:schemeClr val="accent1">
+              <a:shade val="50000"/>
+            </a:schemeClr>
+          </a:lnRef>
+          <a:fillRef idx="1">
+            <a:schemeClr val="accent1"/>
+          </a:fillRef>
+          <a:effectRef idx="0">
+            <a:schemeClr val="accent1"/>
+          </a:effectRef>
+          <a:fontRef idx="minor">
+            <a:schemeClr val="lt1"/>
+          </a:fontRef>
+        </p:style>
+        <p:txBody>
+          <a:bodyPr rtlCol="0" anchor="ctr"/>
+          <a:lstStyle/>
+          <a:p>
+            <a:pPr algn="ctr"/>
+            <a:endParaRPr lang="zh-TW" altLang="en-US"/>
+          </a:p>
+        </p:txBody>
+      </p:sp>
+      <p:sp>
+        <p:nvSpPr>
+          <p:cNvPr id="8" name="文字方塊 7">
+            <a:extLst>
+              <a:ext uri="{FF2B5EF4-FFF2-40B4-BE49-F238E27FC236}">
+                <a16:creationId xmlns:a16="http://schemas.microsoft.com/office/drawing/2014/main" id="{BB962810-3046-4523-B6CC-6EDF55CCF6A1}"/>
+              </a:ext>
+            </a:extLst>
+          </p:cNvPr>
+          <p:cNvSpPr txBox="1"/>
+          <p:nvPr/>
+        </p:nvSpPr>
+        <p:spPr>
+          <a:xfrm>
+            <a:off x="105645" y="1068017"/>
+            <a:ext cx="352338" cy="369332"/>
+          </a:xfrm>
+          <a:prstGeom prst="rect">
+            <a:avLst/>
+          </a:prstGeom>
+          <a:noFill/>
+        </p:spPr>
+        <p:txBody>
+          <a:bodyPr wrap="square" rtlCol="0">
+            <a:spAutoFit/>
+          </a:bodyPr>
+          <a:lstStyle/>
+          <a:p>
+            <a:r>
+              <a:rPr lang="en-US" altLang="zh-TW" dirty="0">
+                <a:solidFill>
+                  <a:srgbClr val="FF0000"/>
+                </a:solidFill>
+              </a:rPr>
+              <a:t>1.</a:t>
+            </a:r>
+            <a:endParaRPr lang="zh-TW" altLang="en-US" dirty="0">
+              <a:solidFill>
+                <a:srgbClr val="FF0000"/>
+              </a:solidFill>
+            </a:endParaRPr>
+          </a:p>
+        </p:txBody>
+      </p:sp>
+      <p:sp>
+        <p:nvSpPr>
+          <p:cNvPr id="9" name="文字方塊 8">
+            <a:extLst>
+              <a:ext uri="{FF2B5EF4-FFF2-40B4-BE49-F238E27FC236}">
+                <a16:creationId xmlns:a16="http://schemas.microsoft.com/office/drawing/2014/main" id="{4ADC2437-7677-405C-8C9B-24D1BAD198F3}"/>
+              </a:ext>
+            </a:extLst>
+          </p:cNvPr>
+          <p:cNvSpPr txBox="1"/>
+          <p:nvPr/>
+        </p:nvSpPr>
+        <p:spPr>
+          <a:xfrm>
+            <a:off x="10570912" y="3787520"/>
+            <a:ext cx="352338" cy="369332"/>
+          </a:xfrm>
+          <a:prstGeom prst="rect">
+            <a:avLst/>
+          </a:prstGeom>
+          <a:noFill/>
+        </p:spPr>
+        <p:txBody>
+          <a:bodyPr wrap="square" rtlCol="0">
+            <a:spAutoFit/>
+          </a:bodyPr>
+          <a:lstStyle/>
+          <a:p>
+            <a:r>
+              <a:rPr lang="en-US" altLang="zh-TW" dirty="0">
+                <a:solidFill>
+                  <a:srgbClr val="FF0000"/>
+                </a:solidFill>
+              </a:rPr>
+              <a:t>2.</a:t>
+            </a:r>
+            <a:endParaRPr lang="zh-TW" altLang="en-US" dirty="0">
+              <a:solidFill>
+                <a:srgbClr val="FF0000"/>
+              </a:solidFill>
+            </a:endParaRPr>
+          </a:p>
+        </p:txBody>
+      </p:sp>
+      <p:sp>
+        <p:nvSpPr>
+          <p:cNvPr id="10" name="矩形: 圓角 9">
+            <a:extLst>
+              <a:ext uri="{FF2B5EF4-FFF2-40B4-BE49-F238E27FC236}">
+                <a16:creationId xmlns:a16="http://schemas.microsoft.com/office/drawing/2014/main" id="{F41FDF7C-BD7A-48A5-B855-791BC1E3FA3A}"/>
+              </a:ext>
+            </a:extLst>
+          </p:cNvPr>
+          <p:cNvSpPr/>
+          <p:nvPr/>
+        </p:nvSpPr>
+        <p:spPr>
+          <a:xfrm>
+            <a:off x="10923250" y="3234281"/>
+            <a:ext cx="846504" cy="293615"/>
+          </a:xfrm>
+          <a:prstGeom prst="roundRect">
+            <a:avLst/>
+          </a:prstGeom>
+          <a:noFill/>
+          <a:ln w="38100">
+            <a:solidFill>
+              <a:srgbClr val="FF0000"/>
+            </a:solidFill>
+          </a:ln>
+        </p:spPr>
+        <p:style>
+          <a:lnRef idx="2">
+            <a:schemeClr val="accent1">
+              <a:shade val="50000"/>
+            </a:schemeClr>
+          </a:lnRef>
+          <a:fillRef idx="1">
+            <a:schemeClr val="accent1"/>
+          </a:fillRef>
+          <a:effectRef idx="0">
+            <a:schemeClr val="accent1"/>
+          </a:effectRef>
+          <a:fontRef idx="minor">
+            <a:schemeClr val="lt1"/>
+          </a:fontRef>
+        </p:style>
+        <p:txBody>
+          <a:bodyPr rtlCol="0" anchor="ctr"/>
+          <a:lstStyle/>
+          <a:p>
+            <a:pPr algn="ctr"/>
+            <a:endParaRPr lang="zh-TW" altLang="en-US"/>
+          </a:p>
+        </p:txBody>
+      </p:sp>
+      <p:sp>
+        <p:nvSpPr>
+          <p:cNvPr id="11" name="文字方塊 10">
+            <a:extLst>
+              <a:ext uri="{FF2B5EF4-FFF2-40B4-BE49-F238E27FC236}">
+                <a16:creationId xmlns:a16="http://schemas.microsoft.com/office/drawing/2014/main" id="{0398BD92-D93C-4536-87B2-9B7DA8EB5484}"/>
+              </a:ext>
+            </a:extLst>
+          </p:cNvPr>
+          <p:cNvSpPr txBox="1"/>
+          <p:nvPr/>
+        </p:nvSpPr>
+        <p:spPr>
+          <a:xfrm>
+            <a:off x="10570912" y="3049615"/>
+            <a:ext cx="352338" cy="369332"/>
+          </a:xfrm>
+          <a:prstGeom prst="rect">
+            <a:avLst/>
+          </a:prstGeom>
+          <a:noFill/>
+        </p:spPr>
+        <p:txBody>
+          <a:bodyPr wrap="square" rtlCol="0">
+            <a:spAutoFit/>
+          </a:bodyPr>
+          <a:lstStyle/>
+          <a:p>
+            <a:r>
+              <a:rPr lang="en-US" altLang="zh-TW" dirty="0">
+                <a:solidFill>
+                  <a:srgbClr val="FF0000"/>
+                </a:solidFill>
+              </a:rPr>
+              <a:t>2.</a:t>
+            </a:r>
+            <a:endParaRPr lang="zh-TW" altLang="en-US" dirty="0">
+              <a:solidFill>
+                <a:srgbClr val="FF0000"/>
+              </a:solidFill>
+            </a:endParaRPr>
+          </a:p>
+        </p:txBody>
+      </p:sp>
+      <p:sp>
+        <p:nvSpPr>
+          <p:cNvPr id="12" name="文字方塊 11">
+            <a:extLst>
+              <a:ext uri="{FF2B5EF4-FFF2-40B4-BE49-F238E27FC236}">
+                <a16:creationId xmlns:a16="http://schemas.microsoft.com/office/drawing/2014/main" id="{A61DF54F-AB5F-4046-956E-1DB321B84BA0}"/>
+              </a:ext>
+            </a:extLst>
+          </p:cNvPr>
+          <p:cNvSpPr txBox="1"/>
+          <p:nvPr/>
+        </p:nvSpPr>
+        <p:spPr>
+          <a:xfrm>
+            <a:off x="8011463" y="3288376"/>
+            <a:ext cx="1820411" cy="923330"/>
+          </a:xfrm>
+          <a:prstGeom prst="rect">
+            <a:avLst/>
+          </a:prstGeom>
+          <a:noFill/>
+          <a:ln w="28575">
+            <a:solidFill>
+              <a:schemeClr val="tx1"/>
+            </a:solidFill>
+          </a:ln>
+        </p:spPr>
+        <p:txBody>
+          <a:bodyPr wrap="square" rtlCol="0">
+            <a:spAutoFit/>
+          </a:bodyPr>
+          <a:lstStyle/>
+          <a:p>
+            <a:r>
+              <a:rPr lang="zh-TW" altLang="en-US" dirty="0">
+                <a:solidFill>
+                  <a:srgbClr val="FF0000"/>
+                </a:solidFill>
+              </a:rPr>
+              <a:t>可以新增在公告或主題裡面</a:t>
+            </a:r>
+            <a:r>
+              <a:rPr lang="en-US" altLang="zh-TW" dirty="0">
+                <a:solidFill>
+                  <a:srgbClr val="FF0000"/>
+                </a:solidFill>
+              </a:rPr>
+              <a:t>(</a:t>
+            </a:r>
+            <a:r>
+              <a:rPr lang="zh-TW" altLang="en-US" dirty="0">
+                <a:solidFill>
+                  <a:srgbClr val="FF0000"/>
+                </a:solidFill>
+              </a:rPr>
+              <a:t>也可以都加入影片</a:t>
+            </a:r>
+            <a:r>
+              <a:rPr lang="en-US" altLang="zh-TW" dirty="0">
+                <a:solidFill>
+                  <a:srgbClr val="FF0000"/>
+                </a:solidFill>
+              </a:rPr>
+              <a:t>)</a:t>
+            </a:r>
+            <a:endParaRPr lang="zh-TW" altLang="en-US" dirty="0">
+              <a:solidFill>
+                <a:srgbClr val="FF0000"/>
+              </a:solidFill>
+            </a:endParaRPr>
+          </a:p>
+        </p:txBody>
+      </p:sp>
+      <p:cxnSp>
+        <p:nvCxnSpPr>
+          <p:cNvPr id="13" name="接點: 肘形 12">
+            <a:extLst>
+              <a:ext uri="{FF2B5EF4-FFF2-40B4-BE49-F238E27FC236}">
+                <a16:creationId xmlns:a16="http://schemas.microsoft.com/office/drawing/2014/main" id="{09F8F558-E78A-4396-8916-19A25E2B4BB9}"/>
+              </a:ext>
+            </a:extLst>
+          </p:cNvPr>
+          <p:cNvCxnSpPr>
+            <a:cxnSpLocks/>
+            <a:stCxn id="10" idx="1"/>
+            <a:endCxn id="12" idx="3"/>
+          </p:cNvCxnSpPr>
+          <p:nvPr/>
+        </p:nvCxnSpPr>
+        <p:spPr>
+          <a:xfrm rot="10800000" flipV="1">
+            <a:off x="9831874" y="3381089"/>
+            <a:ext cx="1091376" cy="368952"/>
+          </a:xfrm>
+          <a:prstGeom prst="bentConnector3">
+            <a:avLst/>
+          </a:prstGeom>
+          <a:ln w="38100">
+            <a:solidFill>
+              <a:srgbClr val="FF0000"/>
+            </a:solidFill>
+            <a:tailEnd type="triangle"/>
+          </a:ln>
+        </p:spPr>
+        <p:style>
+          <a:lnRef idx="1">
+            <a:schemeClr val="accent1"/>
+          </a:lnRef>
+          <a:fillRef idx="0">
+            <a:schemeClr val="accent1"/>
+          </a:fillRef>
+          <a:effectRef idx="0">
+            <a:schemeClr val="accent1"/>
+          </a:effectRef>
+          <a:fontRef idx="minor">
+            <a:schemeClr val="tx1"/>
+          </a:fontRef>
+        </p:style>
+      </p:cxnSp>
+      <p:cxnSp>
+        <p:nvCxnSpPr>
+          <p:cNvPr id="16" name="接點: 肘形 15">
+            <a:extLst>
+              <a:ext uri="{FF2B5EF4-FFF2-40B4-BE49-F238E27FC236}">
+                <a16:creationId xmlns:a16="http://schemas.microsoft.com/office/drawing/2014/main" id="{0D29ED17-FA86-49BF-9DBF-1DA5B526800E}"/>
+              </a:ext>
+            </a:extLst>
+          </p:cNvPr>
+          <p:cNvCxnSpPr>
+            <a:cxnSpLocks/>
+            <a:endCxn id="12" idx="3"/>
+          </p:cNvCxnSpPr>
+          <p:nvPr/>
+        </p:nvCxnSpPr>
+        <p:spPr>
+          <a:xfrm rot="10800000">
+            <a:off x="9831875" y="3750042"/>
+            <a:ext cx="1091375" cy="267953"/>
+          </a:xfrm>
+          <a:prstGeom prst="bentConnector3">
+            <a:avLst/>
+          </a:prstGeom>
+          <a:ln w="38100">
+            <a:solidFill>
+              <a:srgbClr val="FF0000"/>
+            </a:solidFill>
+            <a:tailEnd type="triangle"/>
+          </a:ln>
+        </p:spPr>
+        <p:style>
+          <a:lnRef idx="1">
+            <a:schemeClr val="accent1"/>
+          </a:lnRef>
+          <a:fillRef idx="0">
+            <a:schemeClr val="accent1"/>
+          </a:fillRef>
+          <a:effectRef idx="0">
+            <a:schemeClr val="accent1"/>
+          </a:effectRef>
+          <a:fontRef idx="minor">
+            <a:schemeClr val="tx1"/>
+          </a:fontRef>
+        </p:style>
+      </p:cxnSp>
+    </p:spTree>
+    <p:extLst>
+      <p:ext uri="{BB962C8B-B14F-4D97-AF65-F5344CB8AC3E}">
+        <p14:creationId xmlns:p14="http://schemas.microsoft.com/office/powerpoint/2010/main" val="3643884011"/>
+      </p:ext>
+    </p:extLst>
+  </p:cSld>
+  <p:clrMapOvr>
+    <a:masterClrMapping/>
+  </p:clrMapOvr>
+</p:sld>
+</file>
+
+<file path=ppt/slides/slide31.xml><?xml version="1.0" encoding="utf-8"?>
+<p:sld xmlns:a="http://schemas.openxmlformats.org/drawingml/2006/main" xmlns:r="http://schemas.openxmlformats.org/officeDocument/2006/relationships" xmlns:p="http://schemas.openxmlformats.org/presentationml/2006/main">
+  <p:cSld>
+    <p:spTree>
+      <p:nvGrpSpPr>
+        <p:cNvPr id="1" name=""/>
+        <p:cNvGrpSpPr/>
+        <p:nvPr/>
+      </p:nvGrpSpPr>
+      <p:grpSpPr>
+        <a:xfrm>
+          <a:off x="0" y="0"/>
+          <a:ext cx="0" cy="0"/>
+          <a:chOff x="0" y="0"/>
+          <a:chExt cx="0" cy="0"/>
+        </a:xfrm>
+      </p:grpSpPr>
+      <p:pic>
+        <p:nvPicPr>
+          <p:cNvPr id="5" name="圖片 4">
+            <a:extLst>
+              <a:ext uri="{FF2B5EF4-FFF2-40B4-BE49-F238E27FC236}">
+                <a16:creationId xmlns:a16="http://schemas.microsoft.com/office/drawing/2014/main" id="{CA5EBDCE-27F8-494B-B530-EE120047CAE0}"/>
+              </a:ext>
+            </a:extLst>
+          </p:cNvPr>
+          <p:cNvPicPr>
+            <a:picLocks noChangeAspect="1"/>
+          </p:cNvPicPr>
+          <p:nvPr/>
+        </p:nvPicPr>
+        <p:blipFill>
+          <a:blip r:embed="rId2">
+            <a:extLst>
+              <a:ext uri="{28A0092B-C50C-407E-A947-70E740481C1C}">
+                <a14:useLocalDpi xmlns:a14="http://schemas.microsoft.com/office/drawing/2010/main" val="0"/>
+              </a:ext>
+            </a:extLst>
+          </a:blip>
+          <a:stretch>
+            <a:fillRect/>
+          </a:stretch>
+        </p:blipFill>
+        <p:spPr>
+          <a:xfrm>
+            <a:off x="2294994" y="90021"/>
+            <a:ext cx="7602011" cy="6677957"/>
+          </a:xfrm>
+          <a:prstGeom prst="rect">
+            <a:avLst/>
+          </a:prstGeom>
+          <a:ln>
+            <a:solidFill>
+              <a:schemeClr val="tx1"/>
+            </a:solidFill>
+          </a:ln>
+        </p:spPr>
+      </p:pic>
+      <p:sp>
+        <p:nvSpPr>
+          <p:cNvPr id="6" name="矩形: 圓角 5">
+            <a:extLst>
+              <a:ext uri="{FF2B5EF4-FFF2-40B4-BE49-F238E27FC236}">
+                <a16:creationId xmlns:a16="http://schemas.microsoft.com/office/drawing/2014/main" id="{0867706A-C2CD-4A90-BD71-93E24A25DEAB}"/>
+              </a:ext>
+            </a:extLst>
+          </p:cNvPr>
+          <p:cNvSpPr/>
+          <p:nvPr/>
+        </p:nvSpPr>
+        <p:spPr>
+          <a:xfrm>
+            <a:off x="3655675" y="1310231"/>
+            <a:ext cx="630575" cy="375694"/>
+          </a:xfrm>
+          <a:prstGeom prst="roundRect">
+            <a:avLst/>
+          </a:prstGeom>
+          <a:noFill/>
+          <a:ln w="38100">
+            <a:solidFill>
+              <a:srgbClr val="FF0000"/>
+            </a:solidFill>
+          </a:ln>
+        </p:spPr>
+        <p:style>
+          <a:lnRef idx="2">
+            <a:schemeClr val="accent1">
+              <a:shade val="50000"/>
+            </a:schemeClr>
+          </a:lnRef>
+          <a:fillRef idx="1">
+            <a:schemeClr val="accent1"/>
+          </a:fillRef>
+          <a:effectRef idx="0">
+            <a:schemeClr val="accent1"/>
+          </a:effectRef>
+          <a:fontRef idx="minor">
+            <a:schemeClr val="lt1"/>
+          </a:fontRef>
+        </p:style>
+        <p:txBody>
+          <a:bodyPr rtlCol="0" anchor="ctr"/>
+          <a:lstStyle/>
+          <a:p>
+            <a:pPr algn="ctr"/>
+            <a:endParaRPr lang="zh-TW" altLang="en-US"/>
+          </a:p>
+        </p:txBody>
+      </p:sp>
+      <p:sp>
+        <p:nvSpPr>
+          <p:cNvPr id="7" name="矩形: 圓角 6">
+            <a:extLst>
+              <a:ext uri="{FF2B5EF4-FFF2-40B4-BE49-F238E27FC236}">
+                <a16:creationId xmlns:a16="http://schemas.microsoft.com/office/drawing/2014/main" id="{86B75FB3-1D42-4A6C-9609-970AD04D8656}"/>
+              </a:ext>
+            </a:extLst>
+          </p:cNvPr>
+          <p:cNvSpPr/>
+          <p:nvPr/>
+        </p:nvSpPr>
+        <p:spPr>
+          <a:xfrm>
+            <a:off x="4941550" y="1805531"/>
+            <a:ext cx="1154450" cy="1023394"/>
+          </a:xfrm>
+          <a:prstGeom prst="roundRect">
+            <a:avLst/>
+          </a:prstGeom>
+          <a:noFill/>
+          <a:ln w="38100">
+            <a:solidFill>
+              <a:srgbClr val="FF0000"/>
+            </a:solidFill>
+          </a:ln>
+        </p:spPr>
+        <p:style>
+          <a:lnRef idx="2">
+            <a:schemeClr val="accent1">
+              <a:shade val="50000"/>
+            </a:schemeClr>
+          </a:lnRef>
+          <a:fillRef idx="1">
+            <a:schemeClr val="accent1"/>
+          </a:fillRef>
+          <a:effectRef idx="0">
+            <a:schemeClr val="accent1"/>
+          </a:effectRef>
+          <a:fontRef idx="minor">
+            <a:schemeClr val="lt1"/>
+          </a:fontRef>
+        </p:style>
+        <p:txBody>
+          <a:bodyPr rtlCol="0" anchor="ctr"/>
+          <a:lstStyle/>
+          <a:p>
+            <a:pPr algn="ctr"/>
+            <a:endParaRPr lang="zh-TW" altLang="en-US"/>
+          </a:p>
+        </p:txBody>
+      </p:sp>
+      <p:sp>
+        <p:nvSpPr>
+          <p:cNvPr id="8" name="文字方塊 7">
+            <a:extLst>
+              <a:ext uri="{FF2B5EF4-FFF2-40B4-BE49-F238E27FC236}">
+                <a16:creationId xmlns:a16="http://schemas.microsoft.com/office/drawing/2014/main" id="{BBEF22D9-3190-4CE3-927C-F146FD7D1427}"/>
+              </a:ext>
+            </a:extLst>
+          </p:cNvPr>
+          <p:cNvSpPr txBox="1"/>
+          <p:nvPr/>
+        </p:nvSpPr>
+        <p:spPr>
+          <a:xfrm>
+            <a:off x="4765381" y="1498078"/>
+            <a:ext cx="352338" cy="369332"/>
+          </a:xfrm>
+          <a:prstGeom prst="rect">
+            <a:avLst/>
+          </a:prstGeom>
+          <a:noFill/>
+        </p:spPr>
+        <p:txBody>
+          <a:bodyPr wrap="square" rtlCol="0">
+            <a:spAutoFit/>
+          </a:bodyPr>
+          <a:lstStyle/>
+          <a:p>
+            <a:r>
+              <a:rPr lang="en-US" altLang="zh-TW" dirty="0">
+                <a:solidFill>
+                  <a:srgbClr val="FF0000"/>
+                </a:solidFill>
+              </a:rPr>
+              <a:t>2.</a:t>
+            </a:r>
+            <a:endParaRPr lang="zh-TW" altLang="en-US" dirty="0">
+              <a:solidFill>
+                <a:srgbClr val="FF0000"/>
+              </a:solidFill>
+            </a:endParaRPr>
+          </a:p>
+        </p:txBody>
+      </p:sp>
+      <p:sp>
+        <p:nvSpPr>
+          <p:cNvPr id="9" name="文字方塊 8">
+            <a:extLst>
+              <a:ext uri="{FF2B5EF4-FFF2-40B4-BE49-F238E27FC236}">
+                <a16:creationId xmlns:a16="http://schemas.microsoft.com/office/drawing/2014/main" id="{A090FF92-00F0-47F6-B5AD-4DEBB9B9887B}"/>
+              </a:ext>
+            </a:extLst>
+          </p:cNvPr>
+          <p:cNvSpPr txBox="1"/>
+          <p:nvPr/>
+        </p:nvSpPr>
+        <p:spPr>
+          <a:xfrm>
+            <a:off x="3389062" y="1020790"/>
+            <a:ext cx="352338" cy="369332"/>
+          </a:xfrm>
+          <a:prstGeom prst="rect">
+            <a:avLst/>
+          </a:prstGeom>
+          <a:noFill/>
+        </p:spPr>
+        <p:txBody>
+          <a:bodyPr wrap="square" rtlCol="0">
+            <a:spAutoFit/>
+          </a:bodyPr>
+          <a:lstStyle/>
+          <a:p>
+            <a:r>
+              <a:rPr lang="en-US" altLang="zh-TW" dirty="0">
+                <a:solidFill>
+                  <a:srgbClr val="FF0000"/>
+                </a:solidFill>
+              </a:rPr>
+              <a:t>1.</a:t>
+            </a:r>
+            <a:endParaRPr lang="zh-TW" altLang="en-US" dirty="0">
+              <a:solidFill>
+                <a:srgbClr val="FF0000"/>
+              </a:solidFill>
+            </a:endParaRPr>
+          </a:p>
+        </p:txBody>
+      </p:sp>
+    </p:spTree>
+    <p:extLst>
+      <p:ext uri="{BB962C8B-B14F-4D97-AF65-F5344CB8AC3E}">
+        <p14:creationId xmlns:p14="http://schemas.microsoft.com/office/powerpoint/2010/main" val="1275516574"/>
+      </p:ext>
+    </p:extLst>
+  </p:cSld>
+  <p:clrMapOvr>
+    <a:masterClrMapping/>
+  </p:clrMapOvr>
+</p:sld>
+</file>
+
+<file path=ppt/slides/slide32.xml><?xml version="1.0" encoding="utf-8"?>
+<p:sld xmlns:a="http://schemas.openxmlformats.org/drawingml/2006/main" xmlns:r="http://schemas.openxmlformats.org/officeDocument/2006/relationships" xmlns:p="http://schemas.openxmlformats.org/presentationml/2006/main">
+  <p:cSld>
+    <p:spTree>
+      <p:nvGrpSpPr>
+        <p:cNvPr id="1" name=""/>
+        <p:cNvGrpSpPr/>
+        <p:nvPr/>
+      </p:nvGrpSpPr>
+      <p:grpSpPr>
+        <a:xfrm>
+          <a:off x="0" y="0"/>
+          <a:ext cx="0" cy="0"/>
+          <a:chOff x="0" y="0"/>
+          <a:chExt cx="0" cy="0"/>
+        </a:xfrm>
+      </p:grpSpPr>
+      <p:pic>
+        <p:nvPicPr>
+          <p:cNvPr id="5" name="圖片 4">
+            <a:extLst>
+              <a:ext uri="{FF2B5EF4-FFF2-40B4-BE49-F238E27FC236}">
+                <a16:creationId xmlns:a16="http://schemas.microsoft.com/office/drawing/2014/main" id="{1A4FD002-AB0F-4245-BD14-A9586D680F66}"/>
+              </a:ext>
+            </a:extLst>
+          </p:cNvPr>
+          <p:cNvPicPr>
+            <a:picLocks noChangeAspect="1"/>
+          </p:cNvPicPr>
+          <p:nvPr/>
+        </p:nvPicPr>
+        <p:blipFill>
+          <a:blip r:embed="rId2"/>
+          <a:stretch>
+            <a:fillRect/>
+          </a:stretch>
+        </p:blipFill>
+        <p:spPr>
+          <a:xfrm>
+            <a:off x="218861" y="411505"/>
+            <a:ext cx="11754278" cy="6034989"/>
+          </a:xfrm>
+          <a:prstGeom prst="rect">
+            <a:avLst/>
+          </a:prstGeom>
+          <a:ln>
+            <a:solidFill>
+              <a:schemeClr val="tx1"/>
+            </a:solidFill>
+          </a:ln>
+        </p:spPr>
+      </p:pic>
+      <p:sp>
+        <p:nvSpPr>
+          <p:cNvPr id="6" name="矩形: 圓角 5">
+            <a:extLst>
+              <a:ext uri="{FF2B5EF4-FFF2-40B4-BE49-F238E27FC236}">
+                <a16:creationId xmlns:a16="http://schemas.microsoft.com/office/drawing/2014/main" id="{DFA7B788-2501-4DD9-9049-376A1B8A83C3}"/>
+              </a:ext>
+            </a:extLst>
+          </p:cNvPr>
+          <p:cNvSpPr/>
+          <p:nvPr/>
+        </p:nvSpPr>
+        <p:spPr>
+          <a:xfrm>
+            <a:off x="493374" y="2567531"/>
+            <a:ext cx="5793125" cy="270919"/>
+          </a:xfrm>
+          <a:prstGeom prst="roundRect">
+            <a:avLst/>
+          </a:prstGeom>
+          <a:noFill/>
+          <a:ln w="38100">
+            <a:solidFill>
+              <a:srgbClr val="FF0000"/>
+            </a:solidFill>
+          </a:ln>
+        </p:spPr>
+        <p:style>
+          <a:lnRef idx="2">
+            <a:schemeClr val="accent1">
+              <a:shade val="50000"/>
+            </a:schemeClr>
+          </a:lnRef>
+          <a:fillRef idx="1">
+            <a:schemeClr val="accent1"/>
+          </a:fillRef>
+          <a:effectRef idx="0">
+            <a:schemeClr val="accent1"/>
+          </a:effectRef>
+          <a:fontRef idx="minor">
+            <a:schemeClr val="lt1"/>
+          </a:fontRef>
+        </p:style>
+        <p:txBody>
+          <a:bodyPr rtlCol="0" anchor="ctr"/>
+          <a:lstStyle/>
+          <a:p>
+            <a:pPr algn="ctr"/>
+            <a:endParaRPr lang="zh-TW" altLang="en-US"/>
+          </a:p>
+        </p:txBody>
+      </p:sp>
+      <p:sp>
+        <p:nvSpPr>
+          <p:cNvPr id="7" name="矩形: 圓角 6">
+            <a:extLst>
+              <a:ext uri="{FF2B5EF4-FFF2-40B4-BE49-F238E27FC236}">
+                <a16:creationId xmlns:a16="http://schemas.microsoft.com/office/drawing/2014/main" id="{134466FC-23CE-4262-90EC-4DBD51ED3B01}"/>
+              </a:ext>
+            </a:extLst>
+          </p:cNvPr>
+          <p:cNvSpPr/>
+          <p:nvPr/>
+        </p:nvSpPr>
+        <p:spPr>
+          <a:xfrm>
+            <a:off x="3428037" y="4758281"/>
+            <a:ext cx="305763" cy="270919"/>
+          </a:xfrm>
+          <a:prstGeom prst="roundRect">
+            <a:avLst/>
+          </a:prstGeom>
+          <a:noFill/>
+          <a:ln w="38100">
+            <a:solidFill>
+              <a:srgbClr val="FF0000"/>
+            </a:solidFill>
+          </a:ln>
+        </p:spPr>
+        <p:style>
+          <a:lnRef idx="2">
+            <a:schemeClr val="accent1">
+              <a:shade val="50000"/>
+            </a:schemeClr>
+          </a:lnRef>
+          <a:fillRef idx="1">
+            <a:schemeClr val="accent1"/>
+          </a:fillRef>
+          <a:effectRef idx="0">
+            <a:schemeClr val="accent1"/>
+          </a:effectRef>
+          <a:fontRef idx="minor">
+            <a:schemeClr val="lt1"/>
+          </a:fontRef>
+        </p:style>
+        <p:txBody>
+          <a:bodyPr rtlCol="0" anchor="ctr"/>
+          <a:lstStyle/>
+          <a:p>
+            <a:pPr algn="ctr"/>
+            <a:endParaRPr lang="zh-TW" altLang="en-US"/>
+          </a:p>
+        </p:txBody>
+      </p:sp>
+      <p:sp>
+        <p:nvSpPr>
+          <p:cNvPr id="8" name="文字方塊 7">
+            <a:extLst>
+              <a:ext uri="{FF2B5EF4-FFF2-40B4-BE49-F238E27FC236}">
+                <a16:creationId xmlns:a16="http://schemas.microsoft.com/office/drawing/2014/main" id="{13C029AB-C2A0-470F-AAA0-64F552C6C0B4}"/>
+              </a:ext>
+            </a:extLst>
+          </p:cNvPr>
+          <p:cNvSpPr txBox="1"/>
+          <p:nvPr/>
+        </p:nvSpPr>
+        <p:spPr>
+          <a:xfrm>
+            <a:off x="218861" y="2333658"/>
+            <a:ext cx="352338" cy="369332"/>
+          </a:xfrm>
+          <a:prstGeom prst="rect">
+            <a:avLst/>
+          </a:prstGeom>
+          <a:noFill/>
+        </p:spPr>
+        <p:txBody>
+          <a:bodyPr wrap="square" rtlCol="0">
+            <a:spAutoFit/>
+          </a:bodyPr>
+          <a:lstStyle/>
+          <a:p>
+            <a:r>
+              <a:rPr lang="en-US" altLang="zh-TW" dirty="0">
+                <a:solidFill>
+                  <a:srgbClr val="FF0000"/>
+                </a:solidFill>
+              </a:rPr>
+              <a:t>1.</a:t>
+            </a:r>
+            <a:endParaRPr lang="zh-TW" altLang="en-US" dirty="0">
+              <a:solidFill>
+                <a:srgbClr val="FF0000"/>
+              </a:solidFill>
+            </a:endParaRPr>
+          </a:p>
+        </p:txBody>
+      </p:sp>
+      <p:sp>
+        <p:nvSpPr>
+          <p:cNvPr id="9" name="文字方塊 8">
+            <a:extLst>
+              <a:ext uri="{FF2B5EF4-FFF2-40B4-BE49-F238E27FC236}">
+                <a16:creationId xmlns:a16="http://schemas.microsoft.com/office/drawing/2014/main" id="{46AD9D5C-F60F-46F3-94E7-DBA17BEA2CD0}"/>
+              </a:ext>
+            </a:extLst>
+          </p:cNvPr>
+          <p:cNvSpPr txBox="1"/>
+          <p:nvPr/>
+        </p:nvSpPr>
+        <p:spPr>
+          <a:xfrm>
+            <a:off x="3170948" y="4486381"/>
+            <a:ext cx="352338" cy="369332"/>
+          </a:xfrm>
+          <a:prstGeom prst="rect">
+            <a:avLst/>
+          </a:prstGeom>
+          <a:noFill/>
+        </p:spPr>
+        <p:txBody>
+          <a:bodyPr wrap="square" rtlCol="0">
+            <a:spAutoFit/>
+          </a:bodyPr>
+          <a:lstStyle/>
+          <a:p>
+            <a:r>
+              <a:rPr lang="en-US" altLang="zh-TW" dirty="0">
+                <a:solidFill>
+                  <a:srgbClr val="FF0000"/>
+                </a:solidFill>
+              </a:rPr>
+              <a:t>2.</a:t>
+            </a:r>
+            <a:endParaRPr lang="zh-TW" altLang="en-US" dirty="0">
+              <a:solidFill>
+                <a:srgbClr val="FF0000"/>
+              </a:solidFill>
+            </a:endParaRPr>
+          </a:p>
+        </p:txBody>
+      </p:sp>
+    </p:spTree>
+    <p:extLst>
+      <p:ext uri="{BB962C8B-B14F-4D97-AF65-F5344CB8AC3E}">
+        <p14:creationId xmlns:p14="http://schemas.microsoft.com/office/powerpoint/2010/main" val="612693375"/>
+      </p:ext>
+    </p:extLst>
+  </p:cSld>
+  <p:clrMapOvr>
+    <a:masterClrMapping/>
+  </p:clrMapOvr>
+</p:sld>
+</file>
+
+<file path=ppt/slides/slide33.xml><?xml version="1.0" encoding="utf-8"?>
+<p:sld xmlns:a="http://schemas.openxmlformats.org/drawingml/2006/main" xmlns:r="http://schemas.openxmlformats.org/officeDocument/2006/relationships" xmlns:p="http://schemas.openxmlformats.org/presentationml/2006/main">
+  <p:cSld>
+    <p:spTree>
+      <p:nvGrpSpPr>
+        <p:cNvPr id="1" name=""/>
+        <p:cNvGrpSpPr/>
+        <p:nvPr/>
+      </p:nvGrpSpPr>
+      <p:grpSpPr>
+        <a:xfrm>
+          <a:off x="0" y="0"/>
+          <a:ext cx="0" cy="0"/>
+          <a:chOff x="0" y="0"/>
+          <a:chExt cx="0" cy="0"/>
+        </a:xfrm>
+      </p:grpSpPr>
+      <p:pic>
+        <p:nvPicPr>
+          <p:cNvPr id="11" name="圖片 10">
+            <a:extLst>
+              <a:ext uri="{FF2B5EF4-FFF2-40B4-BE49-F238E27FC236}">
+                <a16:creationId xmlns:a16="http://schemas.microsoft.com/office/drawing/2014/main" id="{7F7092F2-495F-41A2-B183-B022A3010671}"/>
+              </a:ext>
+            </a:extLst>
+          </p:cNvPr>
+          <p:cNvPicPr>
+            <a:picLocks noChangeAspect="1"/>
+          </p:cNvPicPr>
+          <p:nvPr/>
+        </p:nvPicPr>
+        <p:blipFill>
+          <a:blip r:embed="rId2"/>
+          <a:stretch>
+            <a:fillRect/>
+          </a:stretch>
+        </p:blipFill>
+        <p:spPr>
+          <a:xfrm>
+            <a:off x="1947862" y="604837"/>
+            <a:ext cx="8296275" cy="5648325"/>
+          </a:xfrm>
+          <a:prstGeom prst="rect">
+            <a:avLst/>
+          </a:prstGeom>
+          <a:ln>
+            <a:solidFill>
+              <a:schemeClr val="tx1"/>
+            </a:solidFill>
+          </a:ln>
+        </p:spPr>
+      </p:pic>
+      <p:sp>
+        <p:nvSpPr>
+          <p:cNvPr id="6" name="矩形: 圓角 5">
+            <a:extLst>
+              <a:ext uri="{FF2B5EF4-FFF2-40B4-BE49-F238E27FC236}">
+                <a16:creationId xmlns:a16="http://schemas.microsoft.com/office/drawing/2014/main" id="{77D34694-2CB6-48B1-8AE9-FADACDB63438}"/>
+              </a:ext>
+            </a:extLst>
+          </p:cNvPr>
+          <p:cNvSpPr/>
+          <p:nvPr/>
+        </p:nvSpPr>
+        <p:spPr>
+          <a:xfrm>
+            <a:off x="4331949" y="2415132"/>
+            <a:ext cx="506751" cy="242344"/>
+          </a:xfrm>
+          <a:prstGeom prst="roundRect">
+            <a:avLst/>
+          </a:prstGeom>
+          <a:noFill/>
+          <a:ln w="38100">
+            <a:solidFill>
+              <a:srgbClr val="FF0000"/>
+            </a:solidFill>
+          </a:ln>
+        </p:spPr>
+        <p:style>
+          <a:lnRef idx="2">
+            <a:schemeClr val="accent1">
+              <a:shade val="50000"/>
+            </a:schemeClr>
+          </a:lnRef>
+          <a:fillRef idx="1">
+            <a:schemeClr val="accent1"/>
+          </a:fillRef>
+          <a:effectRef idx="0">
+            <a:schemeClr val="accent1"/>
+          </a:effectRef>
+          <a:fontRef idx="minor">
+            <a:schemeClr val="lt1"/>
+          </a:fontRef>
+        </p:style>
+        <p:txBody>
+          <a:bodyPr rtlCol="0" anchor="ctr"/>
+          <a:lstStyle/>
+          <a:p>
+            <a:pPr algn="ctr"/>
+            <a:endParaRPr lang="zh-TW" altLang="en-US"/>
+          </a:p>
+        </p:txBody>
+      </p:sp>
+      <p:sp>
+        <p:nvSpPr>
+          <p:cNvPr id="7" name="矩形: 圓角 6">
+            <a:extLst>
+              <a:ext uri="{FF2B5EF4-FFF2-40B4-BE49-F238E27FC236}">
+                <a16:creationId xmlns:a16="http://schemas.microsoft.com/office/drawing/2014/main" id="{4D7ACB62-D4E7-458B-98BA-C09A73D94859}"/>
+              </a:ext>
+            </a:extLst>
+          </p:cNvPr>
+          <p:cNvSpPr/>
+          <p:nvPr/>
+        </p:nvSpPr>
+        <p:spPr>
+          <a:xfrm>
+            <a:off x="6532225" y="5396456"/>
+            <a:ext cx="1125876" cy="366169"/>
+          </a:xfrm>
+          <a:prstGeom prst="roundRect">
+            <a:avLst/>
+          </a:prstGeom>
+          <a:noFill/>
+          <a:ln w="38100">
+            <a:solidFill>
+              <a:srgbClr val="FF0000"/>
+            </a:solidFill>
+          </a:ln>
+        </p:spPr>
+        <p:style>
+          <a:lnRef idx="2">
+            <a:schemeClr val="accent1">
+              <a:shade val="50000"/>
+            </a:schemeClr>
+          </a:lnRef>
+          <a:fillRef idx="1">
+            <a:schemeClr val="accent1"/>
+          </a:fillRef>
+          <a:effectRef idx="0">
+            <a:schemeClr val="accent1"/>
+          </a:effectRef>
+          <a:fontRef idx="minor">
+            <a:schemeClr val="lt1"/>
+          </a:fontRef>
+        </p:style>
+        <p:txBody>
+          <a:bodyPr rtlCol="0" anchor="ctr"/>
+          <a:lstStyle/>
+          <a:p>
+            <a:pPr algn="ctr"/>
+            <a:endParaRPr lang="zh-TW" altLang="en-US"/>
+          </a:p>
+        </p:txBody>
+      </p:sp>
+      <p:sp>
+        <p:nvSpPr>
+          <p:cNvPr id="8" name="文字方塊 7">
+            <a:extLst>
+              <a:ext uri="{FF2B5EF4-FFF2-40B4-BE49-F238E27FC236}">
+                <a16:creationId xmlns:a16="http://schemas.microsoft.com/office/drawing/2014/main" id="{0659F461-FD85-4821-AB33-A352C2B10E11}"/>
+              </a:ext>
+            </a:extLst>
+          </p:cNvPr>
+          <p:cNvSpPr txBox="1"/>
+          <p:nvPr/>
+        </p:nvSpPr>
+        <p:spPr>
+          <a:xfrm>
+            <a:off x="4055811" y="2224122"/>
+            <a:ext cx="352338" cy="369332"/>
+          </a:xfrm>
+          <a:prstGeom prst="rect">
+            <a:avLst/>
+          </a:prstGeom>
+          <a:noFill/>
+        </p:spPr>
+        <p:txBody>
+          <a:bodyPr wrap="square" rtlCol="0">
+            <a:spAutoFit/>
+          </a:bodyPr>
+          <a:lstStyle/>
+          <a:p>
+            <a:r>
+              <a:rPr lang="en-US" altLang="zh-TW" dirty="0">
+                <a:solidFill>
+                  <a:srgbClr val="FF0000"/>
+                </a:solidFill>
+              </a:rPr>
+              <a:t>1.</a:t>
+            </a:r>
+            <a:endParaRPr lang="zh-TW" altLang="en-US" dirty="0">
+              <a:solidFill>
+                <a:srgbClr val="FF0000"/>
+              </a:solidFill>
+            </a:endParaRPr>
+          </a:p>
+        </p:txBody>
+      </p:sp>
+      <p:sp>
+        <p:nvSpPr>
+          <p:cNvPr id="9" name="文字方塊 8">
+            <a:extLst>
+              <a:ext uri="{FF2B5EF4-FFF2-40B4-BE49-F238E27FC236}">
+                <a16:creationId xmlns:a16="http://schemas.microsoft.com/office/drawing/2014/main" id="{579E632A-5D56-49D2-A79C-969A7182BFBF}"/>
+              </a:ext>
+            </a:extLst>
+          </p:cNvPr>
+          <p:cNvSpPr txBox="1"/>
+          <p:nvPr/>
+        </p:nvSpPr>
+        <p:spPr>
+          <a:xfrm>
+            <a:off x="6265612" y="5162583"/>
+            <a:ext cx="352338" cy="369332"/>
+          </a:xfrm>
+          <a:prstGeom prst="rect">
+            <a:avLst/>
+          </a:prstGeom>
+          <a:noFill/>
+        </p:spPr>
+        <p:txBody>
+          <a:bodyPr wrap="square" rtlCol="0">
+            <a:spAutoFit/>
+          </a:bodyPr>
+          <a:lstStyle/>
+          <a:p>
+            <a:r>
+              <a:rPr lang="en-US" altLang="zh-TW" dirty="0">
+                <a:solidFill>
+                  <a:srgbClr val="FF0000"/>
+                </a:solidFill>
+              </a:rPr>
+              <a:t>2.</a:t>
+            </a:r>
+            <a:endParaRPr lang="zh-TW" altLang="en-US" dirty="0">
+              <a:solidFill>
+                <a:srgbClr val="FF0000"/>
+              </a:solidFill>
+            </a:endParaRPr>
+          </a:p>
+        </p:txBody>
+      </p:sp>
+    </p:spTree>
+    <p:extLst>
+      <p:ext uri="{BB962C8B-B14F-4D97-AF65-F5344CB8AC3E}">
+        <p14:creationId xmlns:p14="http://schemas.microsoft.com/office/powerpoint/2010/main" val="3701989799"/>
+      </p:ext>
+    </p:extLst>
+  </p:cSld>
+  <p:clrMapOvr>
+    <a:masterClrMapping/>
+  </p:clrMapOvr>
+</p:sld>
+</file>
+
+<file path=ppt/slides/slide34.xml><?xml version="1.0" encoding="utf-8"?>
+<p:sld xmlns:a="http://schemas.openxmlformats.org/drawingml/2006/main" xmlns:r="http://schemas.openxmlformats.org/officeDocument/2006/relationships" xmlns:p="http://schemas.openxmlformats.org/presentationml/2006/main">
+  <p:cSld>
+    <p:spTree>
+      <p:nvGrpSpPr>
+        <p:cNvPr id="1" name=""/>
+        <p:cNvGrpSpPr/>
+        <p:nvPr/>
+      </p:nvGrpSpPr>
+      <p:grpSpPr>
+        <a:xfrm>
+          <a:off x="0" y="0"/>
+          <a:ext cx="0" cy="0"/>
+          <a:chOff x="0" y="0"/>
+          <a:chExt cx="0" cy="0"/>
+        </a:xfrm>
+      </p:grpSpPr>
+      <p:pic>
+        <p:nvPicPr>
+          <p:cNvPr id="5" name="圖片 4">
+            <a:extLst>
+              <a:ext uri="{FF2B5EF4-FFF2-40B4-BE49-F238E27FC236}">
+                <a16:creationId xmlns:a16="http://schemas.microsoft.com/office/drawing/2014/main" id="{075E1265-F100-4F72-A0A9-465F8292BAC8}"/>
+              </a:ext>
+            </a:extLst>
+          </p:cNvPr>
+          <p:cNvPicPr>
+            <a:picLocks noChangeAspect="1"/>
+          </p:cNvPicPr>
+          <p:nvPr/>
+        </p:nvPicPr>
+        <p:blipFill>
+          <a:blip r:embed="rId2"/>
+          <a:stretch>
+            <a:fillRect/>
+          </a:stretch>
+        </p:blipFill>
+        <p:spPr>
+          <a:xfrm>
+            <a:off x="171450" y="422085"/>
+            <a:ext cx="11849100" cy="6013829"/>
+          </a:xfrm>
+          <a:prstGeom prst="rect">
+            <a:avLst/>
+          </a:prstGeom>
+          <a:ln>
+            <a:solidFill>
+              <a:schemeClr val="tx1"/>
+            </a:solidFill>
+          </a:ln>
+        </p:spPr>
+      </p:pic>
+      <p:sp>
+        <p:nvSpPr>
+          <p:cNvPr id="6" name="矩形: 圓角 5">
+            <a:extLst>
+              <a:ext uri="{FF2B5EF4-FFF2-40B4-BE49-F238E27FC236}">
+                <a16:creationId xmlns:a16="http://schemas.microsoft.com/office/drawing/2014/main" id="{5A8283F5-CC56-4334-B782-CE378270E267}"/>
+              </a:ext>
+            </a:extLst>
+          </p:cNvPr>
+          <p:cNvSpPr/>
+          <p:nvPr/>
+        </p:nvSpPr>
+        <p:spPr>
+          <a:xfrm>
+            <a:off x="3362325" y="3324225"/>
+            <a:ext cx="733425" cy="819150"/>
+          </a:xfrm>
+          <a:prstGeom prst="roundRect">
+            <a:avLst/>
+          </a:prstGeom>
+          <a:noFill/>
+          <a:ln w="38100">
+            <a:solidFill>
+              <a:srgbClr val="FF0000"/>
+            </a:solidFill>
+          </a:ln>
+        </p:spPr>
+        <p:style>
+          <a:lnRef idx="2">
+            <a:schemeClr val="accent1">
+              <a:shade val="50000"/>
+            </a:schemeClr>
+          </a:lnRef>
+          <a:fillRef idx="1">
+            <a:schemeClr val="accent1"/>
+          </a:fillRef>
+          <a:effectRef idx="0">
+            <a:schemeClr val="accent1"/>
+          </a:effectRef>
+          <a:fontRef idx="minor">
+            <a:schemeClr val="lt1"/>
+          </a:fontRef>
+        </p:style>
+        <p:txBody>
+          <a:bodyPr rtlCol="0" anchor="ctr"/>
+          <a:lstStyle/>
+          <a:p>
+            <a:pPr algn="ctr"/>
+            <a:endParaRPr lang="zh-TW" altLang="en-US"/>
+          </a:p>
+        </p:txBody>
+      </p:sp>
+      <p:sp>
+        <p:nvSpPr>
+          <p:cNvPr id="7" name="矩形: 圓角 6">
+            <a:extLst>
+              <a:ext uri="{FF2B5EF4-FFF2-40B4-BE49-F238E27FC236}">
+                <a16:creationId xmlns:a16="http://schemas.microsoft.com/office/drawing/2014/main" id="{BC9FF597-6C3F-4225-B5A4-5FF95FA43C88}"/>
+              </a:ext>
+            </a:extLst>
+          </p:cNvPr>
+          <p:cNvSpPr/>
+          <p:nvPr/>
+        </p:nvSpPr>
+        <p:spPr>
+          <a:xfrm>
+            <a:off x="4189075" y="6167981"/>
+            <a:ext cx="573425" cy="194719"/>
+          </a:xfrm>
+          <a:prstGeom prst="roundRect">
+            <a:avLst/>
+          </a:prstGeom>
+          <a:noFill/>
+          <a:ln w="38100">
+            <a:solidFill>
+              <a:srgbClr val="FF0000"/>
+            </a:solidFill>
+          </a:ln>
+        </p:spPr>
+        <p:style>
+          <a:lnRef idx="2">
+            <a:schemeClr val="accent1">
+              <a:shade val="50000"/>
+            </a:schemeClr>
+          </a:lnRef>
+          <a:fillRef idx="1">
+            <a:schemeClr val="accent1"/>
+          </a:fillRef>
+          <a:effectRef idx="0">
+            <a:schemeClr val="accent1"/>
+          </a:effectRef>
+          <a:fontRef idx="minor">
+            <a:schemeClr val="lt1"/>
+          </a:fontRef>
+        </p:style>
+        <p:txBody>
+          <a:bodyPr rtlCol="0" anchor="ctr"/>
+          <a:lstStyle/>
+          <a:p>
+            <a:pPr algn="ctr"/>
+            <a:endParaRPr lang="zh-TW" altLang="en-US"/>
+          </a:p>
+        </p:txBody>
+      </p:sp>
+    </p:spTree>
+    <p:extLst>
+      <p:ext uri="{BB962C8B-B14F-4D97-AF65-F5344CB8AC3E}">
+        <p14:creationId xmlns:p14="http://schemas.microsoft.com/office/powerpoint/2010/main" val="3689368813"/>
       </p:ext>
     </p:extLst>
   </p:cSld>

</xml_diff>